<commit_message>
fixed ForwardSampler Presentation and Inputs
</commit_message>
<xml_diff>
--- a/doc/workshop/forwardSampling/ForwardSampling.pptx
+++ b/doc/workshop/forwardSampling/ForwardSampling.pptx
@@ -35070,7 +35070,7 @@
           <p:nvPr>
             <p:extLst>
               <p:ext uri="{D42A27DB-BD31-4B8C-83A1-F6EECF244321}">
-                <p14:modId xmlns:p14="http://schemas.microsoft.com/office/powerpoint/2010/main" val="305189904"/>
+                <p14:modId xmlns:p14="http://schemas.microsoft.com/office/powerpoint/2010/main" val="2391556355"/>
               </p:ext>
             </p:extLst>
           </p:nvPr>
@@ -35139,7 +35139,7 @@
                       <a:r>
                         <a:rPr lang="en-US" sz="1600" b="0" dirty="0" err="1">
                           <a:solidFill>
-                            <a:srgbClr val="0000FF"/>
+                            <a:schemeClr val="tx1"/>
                           </a:solidFill>
                           <a:latin typeface="Arial"/>
                           <a:cs typeface="Arial"/>
@@ -35148,7 +35148,7 @@
                       </a:r>
                       <a:endParaRPr lang="en-US" sz="1600" b="0" dirty="0">
                         <a:solidFill>
-                          <a:srgbClr val="0000FF"/>
+                          <a:schemeClr val="tx1"/>
                         </a:solidFill>
                         <a:latin typeface="Arial"/>
                         <a:cs typeface="Arial"/>
@@ -35172,14 +35172,69 @@
                       <a:r>
                         <a:rPr lang="en-US" sz="1600" b="0" dirty="0">
                           <a:solidFill>
-                            <a:srgbClr val="0000FF"/>
+                            <a:schemeClr val="tx1"/>
                           </a:solidFill>
                           <a:latin typeface="Arial"/>
                           <a:cs typeface="Arial"/>
                         </a:rPr>
                         <a:t>Distributions</a:t>
                       </a:r>
+                    </a:p>
+                  </a:txBody>
+                  <a:tcPr>
+                    <a:solidFill>
+                      <a:schemeClr val="bg1">
+                        <a:lumMod val="85000"/>
+                      </a:schemeClr>
+                    </a:solidFill>
+                  </a:tcPr>
+                </a:tc>
+                <a:tc>
+                  <a:txBody>
+                    <a:bodyPr/>
+                    <a:lstStyle/>
+                    <a:p>
+                      <a:pPr algn="ctr"/>
+                      <a:r>
+                        <a:rPr lang="en-US" sz="1600" b="0" dirty="0">
+                          <a:solidFill>
+                            <a:schemeClr val="tx1"/>
+                          </a:solidFill>
+                          <a:latin typeface="Arial"/>
+                          <a:cs typeface="Arial"/>
+                        </a:rPr>
+                        <a:t>Samplers</a:t>
+                      </a:r>
+                    </a:p>
+                  </a:txBody>
+                  <a:tcPr>
+                    <a:solidFill>
+                      <a:schemeClr val="bg1">
+                        <a:lumMod val="85000"/>
+                      </a:schemeClr>
+                    </a:solidFill>
+                  </a:tcPr>
+                </a:tc>
+                <a:tc>
+                  <a:txBody>
+                    <a:bodyPr/>
+                    <a:lstStyle/>
+                    <a:p>
+                      <a:pPr algn="ctr"/>
+                      <a:r>
+                        <a:rPr lang="en-US" sz="1600" b="0" dirty="0" err="1">
+                          <a:solidFill>
+                            <a:schemeClr val="tx1"/>
+                          </a:solidFill>
+                          <a:latin typeface="Arial"/>
+                          <a:cs typeface="Arial"/>
+                        </a:rPr>
+                        <a:t>DataObjects</a:t>
+                      </a:r>
                       <a:endParaRPr lang="en-US" sz="1600" b="0" dirty="0">
+                        <a:solidFill>
+                          <a:schemeClr val="tx1"/>
+                        </a:solidFill>
                         <a:latin typeface="Arial"/>
                         <a:cs typeface="Arial"/>
                       </a:endParaRPr>
@@ -35202,47 +35257,13 @@
                       <a:r>
                         <a:rPr lang="en-US" sz="1600" b="0" dirty="0">
                           <a:solidFill>
-                            <a:srgbClr val="0000FF"/>
+                            <a:schemeClr val="tx1"/>
                           </a:solidFill>
                           <a:latin typeface="Arial"/>
                           <a:cs typeface="Arial"/>
                         </a:rPr>
-                        <a:t>Samplers</a:t>
+                        <a:t>Models</a:t>
                       </a:r>
-                      <a:endParaRPr lang="en-US" sz="1600" b="0" dirty="0">
-                        <a:latin typeface="Arial"/>
-                        <a:cs typeface="Arial"/>
-                      </a:endParaRPr>
-                    </a:p>
-                  </a:txBody>
-                  <a:tcPr>
-                    <a:solidFill>
-                      <a:schemeClr val="bg1">
-                        <a:lumMod val="85000"/>
-                      </a:schemeClr>
-                    </a:solidFill>
-                  </a:tcPr>
-                </a:tc>
-                <a:tc>
-                  <a:txBody>
-                    <a:bodyPr/>
-                    <a:lstStyle/>
-                    <a:p>
-                      <a:pPr algn="ctr"/>
-                      <a:r>
-                        <a:rPr lang="en-US" sz="1600" b="0" dirty="0" err="1">
-                          <a:solidFill>
-                            <a:srgbClr val="0000FF"/>
-                          </a:solidFill>
-                          <a:latin typeface="Arial"/>
-                          <a:cs typeface="Arial"/>
-                        </a:rPr>
-                        <a:t>DataObjects</a:t>
-                      </a:r>
-                      <a:endParaRPr lang="en-US" sz="1600" b="0" dirty="0">
-                        <a:latin typeface="Arial"/>
-                        <a:cs typeface="Arial"/>
-                      </a:endParaRPr>
                     </a:p>
                   </a:txBody>
                   <a:tcPr>
@@ -35262,47 +35283,13 @@
                       <a:r>
                         <a:rPr lang="en-US" sz="1600" b="0" dirty="0">
                           <a:solidFill>
-                            <a:srgbClr val="0000FF"/>
-                          </a:solidFill>
-                          <a:latin typeface="Arial"/>
-                          <a:cs typeface="Arial"/>
-                        </a:rPr>
-                        <a:t>Models</a:t>
-                      </a:r>
-                      <a:endParaRPr lang="en-US" sz="1600" b="0" dirty="0">
-                        <a:latin typeface="Arial"/>
-                        <a:cs typeface="Arial"/>
-                      </a:endParaRPr>
-                    </a:p>
-                  </a:txBody>
-                  <a:tcPr>
-                    <a:solidFill>
-                      <a:schemeClr val="bg1">
-                        <a:lumMod val="85000"/>
-                      </a:schemeClr>
-                    </a:solidFill>
-                  </a:tcPr>
-                </a:tc>
-                <a:tc>
-                  <a:txBody>
-                    <a:bodyPr/>
-                    <a:lstStyle/>
-                    <a:p>
-                      <a:pPr algn="ctr"/>
-                      <a:r>
-                        <a:rPr lang="en-US" sz="1600" b="0" dirty="0">
-                          <a:solidFill>
-                            <a:srgbClr val="0000FF"/>
+                            <a:schemeClr val="tx1"/>
                           </a:solidFill>
                           <a:latin typeface="Arial"/>
                           <a:cs typeface="Arial"/>
                         </a:rPr>
                         <a:t>Files</a:t>
                       </a:r>
-                      <a:endParaRPr lang="en-US" sz="1600" b="0" dirty="0">
-                        <a:latin typeface="Arial"/>
-                        <a:cs typeface="Arial"/>
-                      </a:endParaRPr>
                     </a:p>
                   </a:txBody>
                   <a:tcPr>
@@ -35329,7 +35316,7 @@
                       <a:r>
                         <a:rPr lang="en-US" sz="1600" b="0" dirty="0" err="1">
                           <a:solidFill>
-                            <a:srgbClr val="0000FF"/>
+                            <a:schemeClr val="tx1"/>
                           </a:solidFill>
                           <a:latin typeface="Arial"/>
                           <a:cs typeface="Arial"/>
@@ -35337,6 +35324,9 @@
                         <a:t>OutStreams</a:t>
                       </a:r>
                       <a:endParaRPr lang="en-US" sz="1600" b="0" dirty="0">
+                        <a:solidFill>
+                          <a:schemeClr val="tx1"/>
+                        </a:solidFill>
                         <a:latin typeface="Arial"/>
                         <a:cs typeface="Arial"/>
                       </a:endParaRPr>
@@ -35359,17 +35349,13 @@
                       <a:r>
                         <a:rPr lang="en-US" sz="1600" b="0" dirty="0">
                           <a:solidFill>
-                            <a:srgbClr val="0000FF"/>
+                            <a:schemeClr val="tx1"/>
                           </a:solidFill>
                           <a:latin typeface="Arial"/>
                           <a:cs typeface="Arial"/>
                         </a:rPr>
                         <a:t>Steps</a:t>
                       </a:r>
-                      <a:endParaRPr lang="en-US" sz="1600" b="0" dirty="0">
-                        <a:latin typeface="Arial"/>
-                        <a:cs typeface="Arial"/>
-                      </a:endParaRPr>
                     </a:p>
                   </a:txBody>
                   <a:tcPr>
@@ -35387,6 +35373,9 @@
                     <a:p>
                       <a:pPr algn="ctr"/>
                       <a:endParaRPr lang="en-US" sz="1600" b="0" dirty="0">
+                        <a:solidFill>
+                          <a:schemeClr val="tx1"/>
+                        </a:solidFill>
                         <a:latin typeface="Arial"/>
                         <a:cs typeface="Arial"/>
                       </a:endParaRPr>
@@ -35407,6 +35396,9 @@
                     <a:p>
                       <a:pPr algn="ctr"/>
                       <a:endParaRPr lang="en-US" sz="1600" b="0" dirty="0">
+                        <a:solidFill>
+                          <a:schemeClr val="tx1"/>
+                        </a:solidFill>
                         <a:latin typeface="Arial"/>
                         <a:cs typeface="Arial"/>
                       </a:endParaRPr>
@@ -35427,6 +35419,9 @@
                     <a:p>
                       <a:pPr algn="ctr"/>
                       <a:endParaRPr lang="en-US" sz="1600" b="0" dirty="0">
+                        <a:solidFill>
+                          <a:schemeClr val="tx1"/>
+                        </a:solidFill>
                         <a:latin typeface="Arial"/>
                         <a:cs typeface="Arial"/>
                       </a:endParaRPr>
@@ -35447,6 +35442,9 @@
                     <a:p>
                       <a:pPr algn="ctr"/>
                       <a:endParaRPr lang="en-US" sz="1600" b="0" dirty="0">
+                        <a:solidFill>
+                          <a:schemeClr val="tx1"/>
+                        </a:solidFill>
                         <a:latin typeface="Arial"/>
                         <a:cs typeface="Arial"/>
                       </a:endParaRPr>
@@ -37625,7 +37623,7 @@
           <a:p>
             <a:r>
               <a:rPr lang="en-US" b="0" dirty="0"/>
-              <a:t>Adding a New Sampler (test3.xml)</a:t>
+              <a:t>Adding a New Sampler</a:t>
             </a:r>
           </a:p>
         </p:txBody>
@@ -38782,6 +38780,44 @@
           </a:graphicData>
         </a:graphic>
       </p:graphicFrame>
+      <p:sp>
+        <p:nvSpPr>
+          <p:cNvPr id="5" name="TextBox 4">
+            <a:extLst>
+              <a:ext uri="{FF2B5EF4-FFF2-40B4-BE49-F238E27FC236}">
+                <a16:creationId xmlns:a16="http://schemas.microsoft.com/office/drawing/2014/main" id="{7AA70586-C49B-3749-B2C9-AE3286112425}"/>
+              </a:ext>
+            </a:extLst>
+          </p:cNvPr>
+          <p:cNvSpPr txBox="1"/>
+          <p:nvPr/>
+        </p:nvSpPr>
+        <p:spPr>
+          <a:xfrm>
+            <a:off x="0" y="6553200"/>
+            <a:ext cx="9144000" cy="307777"/>
+          </a:xfrm>
+          <a:prstGeom prst="rect">
+            <a:avLst/>
+          </a:prstGeom>
+          <a:noFill/>
+        </p:spPr>
+        <p:txBody>
+          <a:bodyPr wrap="square" rtlCol="0">
+            <a:spAutoFit/>
+          </a:bodyPr>
+          <a:lstStyle/>
+          <a:p>
+            <a:pPr algn="ctr"/>
+            <a:r>
+              <a:rPr lang="en-US" sz="1400" dirty="0">
+                <a:latin typeface="+mn-lt"/>
+              </a:rPr>
+              <a:t>Input file name: ForwardSampling3.xml</a:t>
+            </a:r>
+          </a:p>
+        </p:txBody>
+      </p:sp>
     </p:spTree>
     <p:extLst>
       <p:ext uri="{BB962C8B-B14F-4D97-AF65-F5344CB8AC3E}">
@@ -38846,7 +38882,7 @@
           <a:p>
             <a:r>
               <a:rPr lang="en-US" b="0" dirty="0"/>
-              <a:t>Changing the Used Sampler  (test3.xml)</a:t>
+              <a:t>Changing the Used Sampler</a:t>
             </a:r>
           </a:p>
         </p:txBody>
@@ -40092,7 +40128,7 @@
           <p:nvPr>
             <p:extLst>
               <p:ext uri="{D42A27DB-BD31-4B8C-83A1-F6EECF244321}">
-                <p14:modId xmlns:p14="http://schemas.microsoft.com/office/powerpoint/2010/main" val="4242187428"/>
+                <p14:modId xmlns:p14="http://schemas.microsoft.com/office/powerpoint/2010/main" val="2581485414"/>
               </p:ext>
             </p:extLst>
           </p:nvPr>
@@ -40161,7 +40197,7 @@
                       <a:r>
                         <a:rPr lang="en-US" sz="1600" b="0" dirty="0" err="1">
                           <a:solidFill>
-                            <a:srgbClr val="0000FF"/>
+                            <a:schemeClr val="tx1"/>
                           </a:solidFill>
                           <a:latin typeface="Arial"/>
                           <a:cs typeface="Arial"/>
@@ -40170,7 +40206,7 @@
                       </a:r>
                       <a:endParaRPr lang="en-US" sz="1600" b="0" dirty="0">
                         <a:solidFill>
-                          <a:srgbClr val="0000FF"/>
+                          <a:schemeClr val="tx1"/>
                         </a:solidFill>
                         <a:latin typeface="Arial"/>
                         <a:cs typeface="Arial"/>
@@ -40194,14 +40230,69 @@
                       <a:r>
                         <a:rPr lang="en-US" sz="1600" b="0" dirty="0">
                           <a:solidFill>
-                            <a:srgbClr val="0000FF"/>
+                            <a:schemeClr val="tx1"/>
                           </a:solidFill>
                           <a:latin typeface="Arial"/>
                           <a:cs typeface="Arial"/>
                         </a:rPr>
                         <a:t>Distributions</a:t>
                       </a:r>
+                    </a:p>
+                  </a:txBody>
+                  <a:tcPr>
+                    <a:solidFill>
+                      <a:schemeClr val="bg1">
+                        <a:lumMod val="85000"/>
+                      </a:schemeClr>
+                    </a:solidFill>
+                  </a:tcPr>
+                </a:tc>
+                <a:tc>
+                  <a:txBody>
+                    <a:bodyPr/>
+                    <a:lstStyle/>
+                    <a:p>
+                      <a:pPr algn="ctr"/>
+                      <a:r>
+                        <a:rPr lang="en-US" sz="1600" b="0" dirty="0">
+                          <a:solidFill>
+                            <a:schemeClr val="tx1"/>
+                          </a:solidFill>
+                          <a:latin typeface="Arial"/>
+                          <a:cs typeface="Arial"/>
+                        </a:rPr>
+                        <a:t>Samplers</a:t>
+                      </a:r>
+                    </a:p>
+                  </a:txBody>
+                  <a:tcPr>
+                    <a:solidFill>
+                      <a:schemeClr val="bg1">
+                        <a:lumMod val="85000"/>
+                      </a:schemeClr>
+                    </a:solidFill>
+                  </a:tcPr>
+                </a:tc>
+                <a:tc>
+                  <a:txBody>
+                    <a:bodyPr/>
+                    <a:lstStyle/>
+                    <a:p>
+                      <a:pPr algn="ctr"/>
+                      <a:r>
+                        <a:rPr lang="en-US" sz="1600" b="0" dirty="0" err="1">
+                          <a:solidFill>
+                            <a:schemeClr val="tx1"/>
+                          </a:solidFill>
+                          <a:latin typeface="Arial"/>
+                          <a:cs typeface="Arial"/>
+                        </a:rPr>
+                        <a:t>DataObjects</a:t>
+                      </a:r>
                       <a:endParaRPr lang="en-US" sz="1600" b="0" dirty="0">
+                        <a:solidFill>
+                          <a:schemeClr val="tx1"/>
+                        </a:solidFill>
                         <a:latin typeface="Arial"/>
                         <a:cs typeface="Arial"/>
                       </a:endParaRPr>
@@ -40224,47 +40315,13 @@
                       <a:r>
                         <a:rPr lang="en-US" sz="1600" b="0" dirty="0">
                           <a:solidFill>
-                            <a:srgbClr val="0000FF"/>
+                            <a:schemeClr val="tx1"/>
                           </a:solidFill>
                           <a:latin typeface="Arial"/>
                           <a:cs typeface="Arial"/>
                         </a:rPr>
-                        <a:t>Samplers</a:t>
+                        <a:t>Models</a:t>
                       </a:r>
-                      <a:endParaRPr lang="en-US" sz="1600" b="0" dirty="0">
-                        <a:latin typeface="Arial"/>
-                        <a:cs typeface="Arial"/>
-                      </a:endParaRPr>
-                    </a:p>
-                  </a:txBody>
-                  <a:tcPr>
-                    <a:solidFill>
-                      <a:schemeClr val="bg1">
-                        <a:lumMod val="85000"/>
-                      </a:schemeClr>
-                    </a:solidFill>
-                  </a:tcPr>
-                </a:tc>
-                <a:tc>
-                  <a:txBody>
-                    <a:bodyPr/>
-                    <a:lstStyle/>
-                    <a:p>
-                      <a:pPr algn="ctr"/>
-                      <a:r>
-                        <a:rPr lang="en-US" sz="1600" b="0" dirty="0" err="1">
-                          <a:solidFill>
-                            <a:srgbClr val="0000FF"/>
-                          </a:solidFill>
-                          <a:latin typeface="Arial"/>
-                          <a:cs typeface="Arial"/>
-                        </a:rPr>
-                        <a:t>DataObjects</a:t>
-                      </a:r>
-                      <a:endParaRPr lang="en-US" sz="1600" b="0" dirty="0">
-                        <a:latin typeface="Arial"/>
-                        <a:cs typeface="Arial"/>
-                      </a:endParaRPr>
                     </a:p>
                   </a:txBody>
                   <a:tcPr>
@@ -40284,47 +40341,13 @@
                       <a:r>
                         <a:rPr lang="en-US" sz="1600" b="0" dirty="0">
                           <a:solidFill>
-                            <a:srgbClr val="0000FF"/>
-                          </a:solidFill>
-                          <a:latin typeface="Arial"/>
-                          <a:cs typeface="Arial"/>
-                        </a:rPr>
-                        <a:t>Models</a:t>
-                      </a:r>
-                      <a:endParaRPr lang="en-US" sz="1600" b="0" dirty="0">
-                        <a:latin typeface="Arial"/>
-                        <a:cs typeface="Arial"/>
-                      </a:endParaRPr>
-                    </a:p>
-                  </a:txBody>
-                  <a:tcPr>
-                    <a:solidFill>
-                      <a:schemeClr val="bg1">
-                        <a:lumMod val="85000"/>
-                      </a:schemeClr>
-                    </a:solidFill>
-                  </a:tcPr>
-                </a:tc>
-                <a:tc>
-                  <a:txBody>
-                    <a:bodyPr/>
-                    <a:lstStyle/>
-                    <a:p>
-                      <a:pPr algn="ctr"/>
-                      <a:r>
-                        <a:rPr lang="en-US" sz="1600" b="0" dirty="0">
-                          <a:solidFill>
-                            <a:srgbClr val="0000FF"/>
+                            <a:schemeClr val="tx1"/>
                           </a:solidFill>
                           <a:latin typeface="Arial"/>
                           <a:cs typeface="Arial"/>
                         </a:rPr>
                         <a:t>Files</a:t>
                       </a:r>
-                      <a:endParaRPr lang="en-US" sz="1600" b="0" dirty="0">
-                        <a:latin typeface="Arial"/>
-                        <a:cs typeface="Arial"/>
-                      </a:endParaRPr>
                     </a:p>
                   </a:txBody>
                   <a:tcPr>
@@ -40351,7 +40374,7 @@
                       <a:r>
                         <a:rPr lang="en-US" sz="1600" b="0" dirty="0" err="1">
                           <a:solidFill>
-                            <a:srgbClr val="0000FF"/>
+                            <a:schemeClr val="tx1"/>
                           </a:solidFill>
                           <a:latin typeface="Arial"/>
                           <a:cs typeface="Arial"/>
@@ -40359,6 +40382,9 @@
                         <a:t>OutStreams</a:t>
                       </a:r>
                       <a:endParaRPr lang="en-US" sz="1600" b="0" dirty="0">
+                        <a:solidFill>
+                          <a:schemeClr val="tx1"/>
+                        </a:solidFill>
                         <a:latin typeface="Arial"/>
                         <a:cs typeface="Arial"/>
                       </a:endParaRPr>
@@ -40381,17 +40407,13 @@
                       <a:r>
                         <a:rPr lang="en-US" sz="1600" b="0" dirty="0">
                           <a:solidFill>
-                            <a:srgbClr val="0000FF"/>
+                            <a:schemeClr val="tx1"/>
                           </a:solidFill>
                           <a:latin typeface="Arial"/>
                           <a:cs typeface="Arial"/>
                         </a:rPr>
                         <a:t>Steps</a:t>
                       </a:r>
-                      <a:endParaRPr lang="en-US" sz="1600" b="0" dirty="0">
-                        <a:latin typeface="Arial"/>
-                        <a:cs typeface="Arial"/>
-                      </a:endParaRPr>
                     </a:p>
                   </a:txBody>
                   <a:tcPr>
@@ -40409,6 +40431,9 @@
                     <a:p>
                       <a:pPr algn="ctr"/>
                       <a:endParaRPr lang="en-US" sz="1600" b="0" dirty="0">
+                        <a:solidFill>
+                          <a:schemeClr val="tx1"/>
+                        </a:solidFill>
                         <a:latin typeface="Arial"/>
                         <a:cs typeface="Arial"/>
                       </a:endParaRPr>
@@ -40429,6 +40454,9 @@
                     <a:p>
                       <a:pPr algn="ctr"/>
                       <a:endParaRPr lang="en-US" sz="1600" b="0" dirty="0">
+                        <a:solidFill>
+                          <a:schemeClr val="tx1"/>
+                        </a:solidFill>
                         <a:latin typeface="Arial"/>
                         <a:cs typeface="Arial"/>
                       </a:endParaRPr>
@@ -40449,6 +40477,9 @@
                     <a:p>
                       <a:pPr algn="ctr"/>
                       <a:endParaRPr lang="en-US" sz="1600" b="0" dirty="0">
+                        <a:solidFill>
+                          <a:schemeClr val="tx1"/>
+                        </a:solidFill>
                         <a:latin typeface="Arial"/>
                         <a:cs typeface="Arial"/>
                       </a:endParaRPr>
@@ -40469,6 +40500,9 @@
                     <a:p>
                       <a:pPr algn="ctr"/>
                       <a:endParaRPr lang="en-US" sz="1600" b="0" dirty="0">
+                        <a:solidFill>
+                          <a:schemeClr val="tx1"/>
+                        </a:solidFill>
                         <a:latin typeface="Arial"/>
                         <a:cs typeface="Arial"/>
                       </a:endParaRPr>
@@ -40492,6 +40526,44 @@
           </a:graphicData>
         </a:graphic>
       </p:graphicFrame>
+      <p:sp>
+        <p:nvSpPr>
+          <p:cNvPr id="5" name="TextBox 4">
+            <a:extLst>
+              <a:ext uri="{FF2B5EF4-FFF2-40B4-BE49-F238E27FC236}">
+                <a16:creationId xmlns:a16="http://schemas.microsoft.com/office/drawing/2014/main" id="{86768D69-DFB0-E34C-8734-58876F0CB966}"/>
+              </a:ext>
+            </a:extLst>
+          </p:cNvPr>
+          <p:cNvSpPr txBox="1"/>
+          <p:nvPr/>
+        </p:nvSpPr>
+        <p:spPr>
+          <a:xfrm>
+            <a:off x="0" y="6553200"/>
+            <a:ext cx="9144000" cy="307777"/>
+          </a:xfrm>
+          <a:prstGeom prst="rect">
+            <a:avLst/>
+          </a:prstGeom>
+          <a:noFill/>
+        </p:spPr>
+        <p:txBody>
+          <a:bodyPr wrap="square" rtlCol="0">
+            <a:spAutoFit/>
+          </a:bodyPr>
+          <a:lstStyle/>
+          <a:p>
+            <a:pPr algn="ctr"/>
+            <a:r>
+              <a:rPr lang="en-US" sz="1400" dirty="0">
+                <a:latin typeface="+mn-lt"/>
+              </a:rPr>
+              <a:t>Input file name: ForwardSampling3.xml</a:t>
+            </a:r>
+          </a:p>
+        </p:txBody>
+      </p:sp>
     </p:spTree>
     <p:extLst>
       <p:ext uri="{BB962C8B-B14F-4D97-AF65-F5344CB8AC3E}">
@@ -40633,7 +40705,7 @@
           <a:p>
             <a:r>
               <a:rPr lang="en-US" b="0" dirty="0"/>
-              <a:t>Adding a New Sampler  (test4.xml)</a:t>
+              <a:t>Adding a New Sampler</a:t>
             </a:r>
           </a:p>
         </p:txBody>
@@ -40646,7 +40718,7 @@
         </p:nvSpPr>
         <p:spPr>
           <a:xfrm>
-            <a:off x="283275" y="2880743"/>
+            <a:off x="283275" y="2326554"/>
             <a:ext cx="8689594" cy="3893374"/>
           </a:xfrm>
           <a:prstGeom prst="rect">
@@ -41492,7 +41564,7 @@
           <p:nvPr>
             <p:extLst>
               <p:ext uri="{D42A27DB-BD31-4B8C-83A1-F6EECF244321}">
-                <p14:modId xmlns:p14="http://schemas.microsoft.com/office/powerpoint/2010/main" val="387013661"/>
+                <p14:modId xmlns:p14="http://schemas.microsoft.com/office/powerpoint/2010/main" val="1510342054"/>
               </p:ext>
             </p:extLst>
           </p:nvPr>
@@ -41561,7 +41633,7 @@
                       <a:r>
                         <a:rPr lang="en-US" sz="1600" b="0" dirty="0" err="1">
                           <a:solidFill>
-                            <a:srgbClr val="0000FF"/>
+                            <a:schemeClr val="tx1"/>
                           </a:solidFill>
                           <a:latin typeface="Arial"/>
                           <a:cs typeface="Arial"/>
@@ -41570,7 +41642,7 @@
                       </a:r>
                       <a:endParaRPr lang="en-US" sz="1600" b="0" dirty="0">
                         <a:solidFill>
-                          <a:srgbClr val="0000FF"/>
+                          <a:schemeClr val="tx1"/>
                         </a:solidFill>
                         <a:latin typeface="Arial"/>
                         <a:cs typeface="Arial"/>
@@ -41594,14 +41666,69 @@
                       <a:r>
                         <a:rPr lang="en-US" sz="1600" b="0" dirty="0">
                           <a:solidFill>
-                            <a:srgbClr val="0000FF"/>
+                            <a:schemeClr val="tx1"/>
                           </a:solidFill>
                           <a:latin typeface="Arial"/>
                           <a:cs typeface="Arial"/>
                         </a:rPr>
                         <a:t>Distributions</a:t>
                       </a:r>
+                    </a:p>
+                  </a:txBody>
+                  <a:tcPr>
+                    <a:solidFill>
+                      <a:schemeClr val="bg1">
+                        <a:lumMod val="85000"/>
+                      </a:schemeClr>
+                    </a:solidFill>
+                  </a:tcPr>
+                </a:tc>
+                <a:tc>
+                  <a:txBody>
+                    <a:bodyPr/>
+                    <a:lstStyle/>
+                    <a:p>
+                      <a:pPr algn="ctr"/>
+                      <a:r>
+                        <a:rPr lang="en-US" sz="1600" b="0" dirty="0">
+                          <a:solidFill>
+                            <a:schemeClr val="tx1"/>
+                          </a:solidFill>
+                          <a:latin typeface="Arial"/>
+                          <a:cs typeface="Arial"/>
+                        </a:rPr>
+                        <a:t>Samplers</a:t>
+                      </a:r>
+                    </a:p>
+                  </a:txBody>
+                  <a:tcPr>
+                    <a:solidFill>
+                      <a:schemeClr val="bg1">
+                        <a:lumMod val="65000"/>
+                      </a:schemeClr>
+                    </a:solidFill>
+                  </a:tcPr>
+                </a:tc>
+                <a:tc>
+                  <a:txBody>
+                    <a:bodyPr/>
+                    <a:lstStyle/>
+                    <a:p>
+                      <a:pPr algn="ctr"/>
+                      <a:r>
+                        <a:rPr lang="en-US" sz="1600" b="0" dirty="0" err="1">
+                          <a:solidFill>
+                            <a:schemeClr val="tx1"/>
+                          </a:solidFill>
+                          <a:latin typeface="Arial"/>
+                          <a:cs typeface="Arial"/>
+                        </a:rPr>
+                        <a:t>DataObjects</a:t>
+                      </a:r>
                       <a:endParaRPr lang="en-US" sz="1600" b="0" dirty="0">
+                        <a:solidFill>
+                          <a:schemeClr val="tx1"/>
+                        </a:solidFill>
                         <a:latin typeface="Arial"/>
                         <a:cs typeface="Arial"/>
                       </a:endParaRPr>
@@ -41624,47 +41751,13 @@
                       <a:r>
                         <a:rPr lang="en-US" sz="1600" b="0" dirty="0">
                           <a:solidFill>
-                            <a:srgbClr val="0000FF"/>
+                            <a:schemeClr val="tx1"/>
                           </a:solidFill>
                           <a:latin typeface="Arial"/>
                           <a:cs typeface="Arial"/>
                         </a:rPr>
-                        <a:t>Samplers</a:t>
+                        <a:t>Models</a:t>
                       </a:r>
-                      <a:endParaRPr lang="en-US" sz="1600" b="0" dirty="0">
-                        <a:latin typeface="Arial"/>
-                        <a:cs typeface="Arial"/>
-                      </a:endParaRPr>
-                    </a:p>
-                  </a:txBody>
-                  <a:tcPr>
-                    <a:solidFill>
-                      <a:schemeClr val="bg1">
-                        <a:lumMod val="65000"/>
-                      </a:schemeClr>
-                    </a:solidFill>
-                  </a:tcPr>
-                </a:tc>
-                <a:tc>
-                  <a:txBody>
-                    <a:bodyPr/>
-                    <a:lstStyle/>
-                    <a:p>
-                      <a:pPr algn="ctr"/>
-                      <a:r>
-                        <a:rPr lang="en-US" sz="1600" b="0" dirty="0" err="1">
-                          <a:solidFill>
-                            <a:srgbClr val="0000FF"/>
-                          </a:solidFill>
-                          <a:latin typeface="Arial"/>
-                          <a:cs typeface="Arial"/>
-                        </a:rPr>
-                        <a:t>DataObjects</a:t>
-                      </a:r>
-                      <a:endParaRPr lang="en-US" sz="1600" b="0" dirty="0">
-                        <a:latin typeface="Arial"/>
-                        <a:cs typeface="Arial"/>
-                      </a:endParaRPr>
                     </a:p>
                   </a:txBody>
                   <a:tcPr>
@@ -41684,47 +41777,13 @@
                       <a:r>
                         <a:rPr lang="en-US" sz="1600" b="0" dirty="0">
                           <a:solidFill>
-                            <a:srgbClr val="0000FF"/>
-                          </a:solidFill>
-                          <a:latin typeface="Arial"/>
-                          <a:cs typeface="Arial"/>
-                        </a:rPr>
-                        <a:t>Models</a:t>
-                      </a:r>
-                      <a:endParaRPr lang="en-US" sz="1600" b="0" dirty="0">
-                        <a:latin typeface="Arial"/>
-                        <a:cs typeface="Arial"/>
-                      </a:endParaRPr>
-                    </a:p>
-                  </a:txBody>
-                  <a:tcPr>
-                    <a:solidFill>
-                      <a:schemeClr val="bg1">
-                        <a:lumMod val="85000"/>
-                      </a:schemeClr>
-                    </a:solidFill>
-                  </a:tcPr>
-                </a:tc>
-                <a:tc>
-                  <a:txBody>
-                    <a:bodyPr/>
-                    <a:lstStyle/>
-                    <a:p>
-                      <a:pPr algn="ctr"/>
-                      <a:r>
-                        <a:rPr lang="en-US" sz="1600" b="0" dirty="0">
-                          <a:solidFill>
-                            <a:srgbClr val="0000FF"/>
+                            <a:schemeClr val="tx1"/>
                           </a:solidFill>
                           <a:latin typeface="Arial"/>
                           <a:cs typeface="Arial"/>
                         </a:rPr>
                         <a:t>Files</a:t>
                       </a:r>
-                      <a:endParaRPr lang="en-US" sz="1600" b="0" dirty="0">
-                        <a:latin typeface="Arial"/>
-                        <a:cs typeface="Arial"/>
-                      </a:endParaRPr>
                     </a:p>
                   </a:txBody>
                   <a:tcPr>
@@ -41751,7 +41810,7 @@
                       <a:r>
                         <a:rPr lang="en-US" sz="1600" b="0" dirty="0" err="1">
                           <a:solidFill>
-                            <a:srgbClr val="0000FF"/>
+                            <a:schemeClr val="tx1"/>
                           </a:solidFill>
                           <a:latin typeface="Arial"/>
                           <a:cs typeface="Arial"/>
@@ -41759,6 +41818,9 @@
                         <a:t>OutStreams</a:t>
                       </a:r>
                       <a:endParaRPr lang="en-US" sz="1600" b="0" dirty="0">
+                        <a:solidFill>
+                          <a:schemeClr val="tx1"/>
+                        </a:solidFill>
                         <a:latin typeface="Arial"/>
                         <a:cs typeface="Arial"/>
                       </a:endParaRPr>
@@ -41781,14 +41843,33 @@
                       <a:r>
                         <a:rPr lang="en-US" sz="1600" b="0" dirty="0">
                           <a:solidFill>
-                            <a:srgbClr val="0000FF"/>
+                            <a:schemeClr val="tx1"/>
                           </a:solidFill>
                           <a:latin typeface="Arial"/>
                           <a:cs typeface="Arial"/>
                         </a:rPr>
                         <a:t>Steps</a:t>
                       </a:r>
+                    </a:p>
+                  </a:txBody>
+                  <a:tcPr>
+                    <a:solidFill>
+                      <a:schemeClr val="bg1">
+                        <a:lumMod val="85000"/>
+                      </a:schemeClr>
+                    </a:solidFill>
+                  </a:tcPr>
+                </a:tc>
+                <a:tc>
+                  <a:txBody>
+                    <a:bodyPr/>
+                    <a:lstStyle/>
+                    <a:p>
+                      <a:pPr algn="ctr"/>
                       <a:endParaRPr lang="en-US" sz="1600" b="0" dirty="0">
+                        <a:solidFill>
+                          <a:schemeClr val="tx1"/>
+                        </a:solidFill>
                         <a:latin typeface="Arial"/>
                         <a:cs typeface="Arial"/>
                       </a:endParaRPr>
@@ -41809,6 +41890,9 @@
                     <a:p>
                       <a:pPr algn="ctr"/>
                       <a:endParaRPr lang="en-US" sz="1600" b="0" dirty="0">
+                        <a:solidFill>
+                          <a:schemeClr val="tx1"/>
+                        </a:solidFill>
                         <a:latin typeface="Arial"/>
                         <a:cs typeface="Arial"/>
                       </a:endParaRPr>
@@ -41829,6 +41913,9 @@
                     <a:p>
                       <a:pPr algn="ctr"/>
                       <a:endParaRPr lang="en-US" sz="1600" b="0" dirty="0">
+                        <a:solidFill>
+                          <a:schemeClr val="tx1"/>
+                        </a:solidFill>
                         <a:latin typeface="Arial"/>
                         <a:cs typeface="Arial"/>
                       </a:endParaRPr>
@@ -41849,26 +41936,9 @@
                     <a:p>
                       <a:pPr algn="ctr"/>
                       <a:endParaRPr lang="en-US" sz="1600" b="0" dirty="0">
-                        <a:latin typeface="Arial"/>
-                        <a:cs typeface="Arial"/>
-                      </a:endParaRPr>
-                    </a:p>
-                  </a:txBody>
-                  <a:tcPr>
-                    <a:solidFill>
-                      <a:schemeClr val="bg1">
-                        <a:lumMod val="85000"/>
-                      </a:schemeClr>
-                    </a:solidFill>
-                  </a:tcPr>
-                </a:tc>
-                <a:tc>
-                  <a:txBody>
-                    <a:bodyPr/>
-                    <a:lstStyle/>
-                    <a:p>
-                      <a:pPr algn="ctr"/>
-                      <a:endParaRPr lang="en-US" sz="1600" b="0" dirty="0">
+                        <a:solidFill>
+                          <a:schemeClr val="tx1"/>
+                        </a:solidFill>
                         <a:latin typeface="Arial"/>
                         <a:cs typeface="Arial"/>
                       </a:endParaRPr>
@@ -41892,6 +41962,44 @@
           </a:graphicData>
         </a:graphic>
       </p:graphicFrame>
+      <p:sp>
+        <p:nvSpPr>
+          <p:cNvPr id="5" name="TextBox 4">
+            <a:extLst>
+              <a:ext uri="{FF2B5EF4-FFF2-40B4-BE49-F238E27FC236}">
+                <a16:creationId xmlns:a16="http://schemas.microsoft.com/office/drawing/2014/main" id="{0B5A4848-F7D8-5341-A20C-05EADA895270}"/>
+              </a:ext>
+            </a:extLst>
+          </p:cNvPr>
+          <p:cNvSpPr txBox="1"/>
+          <p:nvPr/>
+        </p:nvSpPr>
+        <p:spPr>
+          <a:xfrm>
+            <a:off x="0" y="6553200"/>
+            <a:ext cx="9144000" cy="307777"/>
+          </a:xfrm>
+          <a:prstGeom prst="rect">
+            <a:avLst/>
+          </a:prstGeom>
+          <a:noFill/>
+        </p:spPr>
+        <p:txBody>
+          <a:bodyPr wrap="square" rtlCol="0">
+            <a:spAutoFit/>
+          </a:bodyPr>
+          <a:lstStyle/>
+          <a:p>
+            <a:pPr algn="ctr"/>
+            <a:r>
+              <a:rPr lang="en-US" sz="1400" dirty="0">
+                <a:latin typeface="+mn-lt"/>
+              </a:rPr>
+              <a:t>Input file name: ForwardSampling4.xml</a:t>
+            </a:r>
+          </a:p>
+        </p:txBody>
+      </p:sp>
     </p:spTree>
     <p:extLst>
       <p:ext uri="{BB962C8B-B14F-4D97-AF65-F5344CB8AC3E}">
@@ -41956,7 +42064,7 @@
           <a:p>
             <a:r>
               <a:rPr lang="en-US" b="0" dirty="0"/>
-              <a:t>Changing the Used Sampler  (test4.xml)</a:t>
+              <a:t>Changing the Used Sampler</a:t>
             </a:r>
           </a:p>
         </p:txBody>
@@ -43218,7 +43326,7 @@
           <p:nvPr>
             <p:extLst>
               <p:ext uri="{D42A27DB-BD31-4B8C-83A1-F6EECF244321}">
-                <p14:modId xmlns:p14="http://schemas.microsoft.com/office/powerpoint/2010/main" val="3133236201"/>
+                <p14:modId xmlns:p14="http://schemas.microsoft.com/office/powerpoint/2010/main" val="3247798708"/>
               </p:ext>
             </p:extLst>
           </p:nvPr>
@@ -43287,7 +43395,7 @@
                       <a:r>
                         <a:rPr lang="en-US" sz="1600" b="0" dirty="0" err="1">
                           <a:solidFill>
-                            <a:srgbClr val="0000FF"/>
+                            <a:schemeClr val="tx1"/>
                           </a:solidFill>
                           <a:latin typeface="Arial"/>
                           <a:cs typeface="Arial"/>
@@ -43296,7 +43404,7 @@
                       </a:r>
                       <a:endParaRPr lang="en-US" sz="1600" b="0" dirty="0">
                         <a:solidFill>
-                          <a:srgbClr val="0000FF"/>
+                          <a:schemeClr val="tx1"/>
                         </a:solidFill>
                         <a:latin typeface="Arial"/>
                         <a:cs typeface="Arial"/>
@@ -43320,14 +43428,69 @@
                       <a:r>
                         <a:rPr lang="en-US" sz="1600" b="0" dirty="0">
                           <a:solidFill>
-                            <a:srgbClr val="0000FF"/>
+                            <a:schemeClr val="tx1"/>
                           </a:solidFill>
                           <a:latin typeface="Arial"/>
                           <a:cs typeface="Arial"/>
                         </a:rPr>
                         <a:t>Distributions</a:t>
                       </a:r>
+                    </a:p>
+                  </a:txBody>
+                  <a:tcPr>
+                    <a:solidFill>
+                      <a:schemeClr val="bg1">
+                        <a:lumMod val="85000"/>
+                      </a:schemeClr>
+                    </a:solidFill>
+                  </a:tcPr>
+                </a:tc>
+                <a:tc>
+                  <a:txBody>
+                    <a:bodyPr/>
+                    <a:lstStyle/>
+                    <a:p>
+                      <a:pPr algn="ctr"/>
+                      <a:r>
+                        <a:rPr lang="en-US" sz="1600" b="0" dirty="0">
+                          <a:solidFill>
+                            <a:schemeClr val="tx1"/>
+                          </a:solidFill>
+                          <a:latin typeface="Arial"/>
+                          <a:cs typeface="Arial"/>
+                        </a:rPr>
+                        <a:t>Samplers</a:t>
+                      </a:r>
+                    </a:p>
+                  </a:txBody>
+                  <a:tcPr>
+                    <a:solidFill>
+                      <a:schemeClr val="bg1">
+                        <a:lumMod val="85000"/>
+                      </a:schemeClr>
+                    </a:solidFill>
+                  </a:tcPr>
+                </a:tc>
+                <a:tc>
+                  <a:txBody>
+                    <a:bodyPr/>
+                    <a:lstStyle/>
+                    <a:p>
+                      <a:pPr algn="ctr"/>
+                      <a:r>
+                        <a:rPr lang="en-US" sz="1600" b="0" dirty="0" err="1">
+                          <a:solidFill>
+                            <a:schemeClr val="tx1"/>
+                          </a:solidFill>
+                          <a:latin typeface="Arial"/>
+                          <a:cs typeface="Arial"/>
+                        </a:rPr>
+                        <a:t>DataObjects</a:t>
+                      </a:r>
                       <a:endParaRPr lang="en-US" sz="1600" b="0" dirty="0">
+                        <a:solidFill>
+                          <a:schemeClr val="tx1"/>
+                        </a:solidFill>
                         <a:latin typeface="Arial"/>
                         <a:cs typeface="Arial"/>
                       </a:endParaRPr>
@@ -43350,47 +43513,13 @@
                       <a:r>
                         <a:rPr lang="en-US" sz="1600" b="0" dirty="0">
                           <a:solidFill>
-                            <a:srgbClr val="0000FF"/>
+                            <a:schemeClr val="tx1"/>
                           </a:solidFill>
                           <a:latin typeface="Arial"/>
                           <a:cs typeface="Arial"/>
                         </a:rPr>
-                        <a:t>Samplers</a:t>
+                        <a:t>Models</a:t>
                       </a:r>
-                      <a:endParaRPr lang="en-US" sz="1600" b="0" dirty="0">
-                        <a:latin typeface="Arial"/>
-                        <a:cs typeface="Arial"/>
-                      </a:endParaRPr>
-                    </a:p>
-                  </a:txBody>
-                  <a:tcPr>
-                    <a:solidFill>
-                      <a:schemeClr val="bg1">
-                        <a:lumMod val="85000"/>
-                      </a:schemeClr>
-                    </a:solidFill>
-                  </a:tcPr>
-                </a:tc>
-                <a:tc>
-                  <a:txBody>
-                    <a:bodyPr/>
-                    <a:lstStyle/>
-                    <a:p>
-                      <a:pPr algn="ctr"/>
-                      <a:r>
-                        <a:rPr lang="en-US" sz="1600" b="0" dirty="0" err="1">
-                          <a:solidFill>
-                            <a:srgbClr val="0000FF"/>
-                          </a:solidFill>
-                          <a:latin typeface="Arial"/>
-                          <a:cs typeface="Arial"/>
-                        </a:rPr>
-                        <a:t>DataObjects</a:t>
-                      </a:r>
-                      <a:endParaRPr lang="en-US" sz="1600" b="0" dirty="0">
-                        <a:latin typeface="Arial"/>
-                        <a:cs typeface="Arial"/>
-                      </a:endParaRPr>
                     </a:p>
                   </a:txBody>
                   <a:tcPr>
@@ -43410,47 +43539,13 @@
                       <a:r>
                         <a:rPr lang="en-US" sz="1600" b="0" dirty="0">
                           <a:solidFill>
-                            <a:srgbClr val="0000FF"/>
-                          </a:solidFill>
-                          <a:latin typeface="Arial"/>
-                          <a:cs typeface="Arial"/>
-                        </a:rPr>
-                        <a:t>Models</a:t>
-                      </a:r>
-                      <a:endParaRPr lang="en-US" sz="1600" b="0" dirty="0">
-                        <a:latin typeface="Arial"/>
-                        <a:cs typeface="Arial"/>
-                      </a:endParaRPr>
-                    </a:p>
-                  </a:txBody>
-                  <a:tcPr>
-                    <a:solidFill>
-                      <a:schemeClr val="bg1">
-                        <a:lumMod val="85000"/>
-                      </a:schemeClr>
-                    </a:solidFill>
-                  </a:tcPr>
-                </a:tc>
-                <a:tc>
-                  <a:txBody>
-                    <a:bodyPr/>
-                    <a:lstStyle/>
-                    <a:p>
-                      <a:pPr algn="ctr"/>
-                      <a:r>
-                        <a:rPr lang="en-US" sz="1600" b="0" dirty="0">
-                          <a:solidFill>
-                            <a:srgbClr val="0000FF"/>
+                            <a:schemeClr val="tx1"/>
                           </a:solidFill>
                           <a:latin typeface="Arial"/>
                           <a:cs typeface="Arial"/>
                         </a:rPr>
                         <a:t>Files</a:t>
                       </a:r>
-                      <a:endParaRPr lang="en-US" sz="1600" b="0" dirty="0">
-                        <a:latin typeface="Arial"/>
-                        <a:cs typeface="Arial"/>
-                      </a:endParaRPr>
                     </a:p>
                   </a:txBody>
                   <a:tcPr>
@@ -43477,7 +43572,7 @@
                       <a:r>
                         <a:rPr lang="en-US" sz="1600" b="0" dirty="0" err="1">
                           <a:solidFill>
-                            <a:srgbClr val="0000FF"/>
+                            <a:schemeClr val="tx1"/>
                           </a:solidFill>
                           <a:latin typeface="Arial"/>
                           <a:cs typeface="Arial"/>
@@ -43485,6 +43580,9 @@
                         <a:t>OutStreams</a:t>
                       </a:r>
                       <a:endParaRPr lang="en-US" sz="1600" b="0" dirty="0">
+                        <a:solidFill>
+                          <a:schemeClr val="tx1"/>
+                        </a:solidFill>
                         <a:latin typeface="Arial"/>
                         <a:cs typeface="Arial"/>
                       </a:endParaRPr>
@@ -43507,17 +43605,13 @@
                       <a:r>
                         <a:rPr lang="en-US" sz="1600" b="0" dirty="0">
                           <a:solidFill>
-                            <a:srgbClr val="0000FF"/>
+                            <a:schemeClr val="tx1"/>
                           </a:solidFill>
                           <a:latin typeface="Arial"/>
                           <a:cs typeface="Arial"/>
                         </a:rPr>
                         <a:t>Steps</a:t>
                       </a:r>
-                      <a:endParaRPr lang="en-US" sz="1600" b="0" dirty="0">
-                        <a:latin typeface="Arial"/>
-                        <a:cs typeface="Arial"/>
-                      </a:endParaRPr>
                     </a:p>
                   </a:txBody>
                   <a:tcPr>
@@ -43535,6 +43629,9 @@
                     <a:p>
                       <a:pPr algn="ctr"/>
                       <a:endParaRPr lang="en-US" sz="1600" b="0" dirty="0">
+                        <a:solidFill>
+                          <a:schemeClr val="tx1"/>
+                        </a:solidFill>
                         <a:latin typeface="Arial"/>
                         <a:cs typeface="Arial"/>
                       </a:endParaRPr>
@@ -43555,6 +43652,9 @@
                     <a:p>
                       <a:pPr algn="ctr"/>
                       <a:endParaRPr lang="en-US" sz="1600" b="0" dirty="0">
+                        <a:solidFill>
+                          <a:schemeClr val="tx1"/>
+                        </a:solidFill>
                         <a:latin typeface="Arial"/>
                         <a:cs typeface="Arial"/>
                       </a:endParaRPr>
@@ -43575,6 +43675,9 @@
                     <a:p>
                       <a:pPr algn="ctr"/>
                       <a:endParaRPr lang="en-US" sz="1600" b="0" dirty="0">
+                        <a:solidFill>
+                          <a:schemeClr val="tx1"/>
+                        </a:solidFill>
                         <a:latin typeface="Arial"/>
                         <a:cs typeface="Arial"/>
                       </a:endParaRPr>
@@ -43595,6 +43698,9 @@
                     <a:p>
                       <a:pPr algn="ctr"/>
                       <a:endParaRPr lang="en-US" sz="1600" b="0" dirty="0">
+                        <a:solidFill>
+                          <a:schemeClr val="tx1"/>
+                        </a:solidFill>
                         <a:latin typeface="Arial"/>
                         <a:cs typeface="Arial"/>
                       </a:endParaRPr>
@@ -43618,6 +43724,44 @@
           </a:graphicData>
         </a:graphic>
       </p:graphicFrame>
+      <p:sp>
+        <p:nvSpPr>
+          <p:cNvPr id="5" name="TextBox 4">
+            <a:extLst>
+              <a:ext uri="{FF2B5EF4-FFF2-40B4-BE49-F238E27FC236}">
+                <a16:creationId xmlns:a16="http://schemas.microsoft.com/office/drawing/2014/main" id="{C110BFF8-87AE-5A43-8253-508BC6D91E57}"/>
+              </a:ext>
+            </a:extLst>
+          </p:cNvPr>
+          <p:cNvSpPr txBox="1"/>
+          <p:nvPr/>
+        </p:nvSpPr>
+        <p:spPr>
+          <a:xfrm>
+            <a:off x="0" y="6553200"/>
+            <a:ext cx="9144000" cy="307777"/>
+          </a:xfrm>
+          <a:prstGeom prst="rect">
+            <a:avLst/>
+          </a:prstGeom>
+          <a:noFill/>
+        </p:spPr>
+        <p:txBody>
+          <a:bodyPr wrap="square" rtlCol="0">
+            <a:spAutoFit/>
+          </a:bodyPr>
+          <a:lstStyle/>
+          <a:p>
+            <a:pPr algn="ctr"/>
+            <a:r>
+              <a:rPr lang="en-US" sz="1400" dirty="0">
+                <a:latin typeface="+mn-lt"/>
+              </a:rPr>
+              <a:t>Input file name: ForwardSampling4.xml</a:t>
+            </a:r>
+          </a:p>
+        </p:txBody>
+      </p:sp>
     </p:spTree>
     <p:extLst>
       <p:ext uri="{BB962C8B-B14F-4D97-AF65-F5344CB8AC3E}">
@@ -43716,13 +43860,7 @@
           <a:p>
             <a:r>
               <a:rPr lang="en-US" dirty="0"/>
-              <a:t>Learn the concept of RAVEN “Step”</a:t>
-            </a:r>
-          </a:p>
-          <a:p>
-            <a:r>
-              <a:rPr lang="en-US" dirty="0"/>
-              <a:t>Learn how RAVEN Steps and Entities are assembled in the input file</a:t>
+              <a:t>Learn how RAVEN Steps and Entities are assembled in the input file for statistical analysis</a:t>
             </a:r>
           </a:p>
           <a:p>
@@ -43754,33 +43892,6 @@
           </a:p>
           <a:p>
             <a:endParaRPr lang="en-US" dirty="0"/>
-          </a:p>
-          <a:p>
-            <a:r>
-              <a:rPr lang="en-US" dirty="0"/>
-              <a:t>Additional info</a:t>
-            </a:r>
-          </a:p>
-          <a:p>
-            <a:pPr lvl="1"/>
-            <a:r>
-              <a:rPr lang="en-US" dirty="0"/>
-              <a:t>RAVEN user manual (user guide)</a:t>
-            </a:r>
-          </a:p>
-          <a:p>
-            <a:pPr lvl="1"/>
-            <a:r>
-              <a:rPr lang="en-US" dirty="0"/>
-              <a:t>Input files shown in this workshop</a:t>
-            </a:r>
-          </a:p>
-          <a:p>
-            <a:pPr lvl="1"/>
-            <a:r>
-              <a:rPr lang="en-US" dirty="0"/>
-              <a:t>RAVEN regression tests</a:t>
-            </a:r>
           </a:p>
           <a:p>
             <a:endParaRPr lang="en-US" dirty="0"/>
@@ -44826,7 +44937,7 @@
           <p:nvPr>
             <p:extLst>
               <p:ext uri="{D42A27DB-BD31-4B8C-83A1-F6EECF244321}">
-                <p14:modId xmlns:p14="http://schemas.microsoft.com/office/powerpoint/2010/main" val="1788724961"/>
+                <p14:modId xmlns:p14="http://schemas.microsoft.com/office/powerpoint/2010/main" val="2296677091"/>
               </p:ext>
             </p:extLst>
           </p:nvPr>
@@ -44895,7 +45006,7 @@
                       <a:r>
                         <a:rPr lang="en-US" sz="1600" b="0" dirty="0" err="1">
                           <a:solidFill>
-                            <a:srgbClr val="0000FF"/>
+                            <a:schemeClr val="tx1"/>
                           </a:solidFill>
                           <a:latin typeface="Arial"/>
                           <a:cs typeface="Arial"/>
@@ -44904,7 +45015,7 @@
                       </a:r>
                       <a:endParaRPr lang="en-US" sz="1600" b="0" dirty="0">
                         <a:solidFill>
-                          <a:srgbClr val="0000FF"/>
+                          <a:schemeClr val="tx1"/>
                         </a:solidFill>
                         <a:latin typeface="Arial"/>
                         <a:cs typeface="Arial"/>
@@ -44928,14 +45039,69 @@
                       <a:r>
                         <a:rPr lang="en-US" sz="1600" b="0" dirty="0">
                           <a:solidFill>
-                            <a:srgbClr val="0000FF"/>
+                            <a:schemeClr val="tx1"/>
                           </a:solidFill>
                           <a:latin typeface="Arial"/>
                           <a:cs typeface="Arial"/>
                         </a:rPr>
                         <a:t>Distributions</a:t>
                       </a:r>
+                    </a:p>
+                  </a:txBody>
+                  <a:tcPr>
+                    <a:solidFill>
+                      <a:schemeClr val="bg1">
+                        <a:lumMod val="85000"/>
+                      </a:schemeClr>
+                    </a:solidFill>
+                  </a:tcPr>
+                </a:tc>
+                <a:tc>
+                  <a:txBody>
+                    <a:bodyPr/>
+                    <a:lstStyle/>
+                    <a:p>
+                      <a:pPr algn="ctr"/>
+                      <a:r>
+                        <a:rPr lang="en-US" sz="1600" b="0" dirty="0">
+                          <a:solidFill>
+                            <a:schemeClr val="tx1"/>
+                          </a:solidFill>
+                          <a:latin typeface="Arial"/>
+                          <a:cs typeface="Arial"/>
+                        </a:rPr>
+                        <a:t>Samplers</a:t>
+                      </a:r>
+                    </a:p>
+                  </a:txBody>
+                  <a:tcPr>
+                    <a:solidFill>
+                      <a:schemeClr val="bg1">
+                        <a:lumMod val="85000"/>
+                      </a:schemeClr>
+                    </a:solidFill>
+                  </a:tcPr>
+                </a:tc>
+                <a:tc>
+                  <a:txBody>
+                    <a:bodyPr/>
+                    <a:lstStyle/>
+                    <a:p>
+                      <a:pPr algn="ctr"/>
+                      <a:r>
+                        <a:rPr lang="en-US" sz="1600" b="0" dirty="0" err="1">
+                          <a:solidFill>
+                            <a:schemeClr val="tx1"/>
+                          </a:solidFill>
+                          <a:latin typeface="Arial"/>
+                          <a:cs typeface="Arial"/>
+                        </a:rPr>
+                        <a:t>DataObjects</a:t>
+                      </a:r>
                       <a:endParaRPr lang="en-US" sz="1600" b="0" dirty="0">
+                        <a:solidFill>
+                          <a:schemeClr val="tx1"/>
+                        </a:solidFill>
                         <a:latin typeface="Arial"/>
                         <a:cs typeface="Arial"/>
                       </a:endParaRPr>
@@ -44958,47 +45124,13 @@
                       <a:r>
                         <a:rPr lang="en-US" sz="1600" b="0" dirty="0">
                           <a:solidFill>
-                            <a:srgbClr val="0000FF"/>
+                            <a:schemeClr val="tx1"/>
                           </a:solidFill>
                           <a:latin typeface="Arial"/>
                           <a:cs typeface="Arial"/>
                         </a:rPr>
-                        <a:t>Samplers</a:t>
+                        <a:t>Models</a:t>
                       </a:r>
-                      <a:endParaRPr lang="en-US" sz="1600" b="0" dirty="0">
-                        <a:latin typeface="Arial"/>
-                        <a:cs typeface="Arial"/>
-                      </a:endParaRPr>
-                    </a:p>
-                  </a:txBody>
-                  <a:tcPr>
-                    <a:solidFill>
-                      <a:schemeClr val="bg1">
-                        <a:lumMod val="85000"/>
-                      </a:schemeClr>
-                    </a:solidFill>
-                  </a:tcPr>
-                </a:tc>
-                <a:tc>
-                  <a:txBody>
-                    <a:bodyPr/>
-                    <a:lstStyle/>
-                    <a:p>
-                      <a:pPr algn="ctr"/>
-                      <a:r>
-                        <a:rPr lang="en-US" sz="1600" b="0" dirty="0" err="1">
-                          <a:solidFill>
-                            <a:srgbClr val="0000FF"/>
-                          </a:solidFill>
-                          <a:latin typeface="Arial"/>
-                          <a:cs typeface="Arial"/>
-                        </a:rPr>
-                        <a:t>DataObjects</a:t>
-                      </a:r>
-                      <a:endParaRPr lang="en-US" sz="1600" b="0" dirty="0">
-                        <a:latin typeface="Arial"/>
-                        <a:cs typeface="Arial"/>
-                      </a:endParaRPr>
                     </a:p>
                   </a:txBody>
                   <a:tcPr>
@@ -45018,47 +45150,13 @@
                       <a:r>
                         <a:rPr lang="en-US" sz="1600" b="0" dirty="0">
                           <a:solidFill>
-                            <a:srgbClr val="0000FF"/>
-                          </a:solidFill>
-                          <a:latin typeface="Arial"/>
-                          <a:cs typeface="Arial"/>
-                        </a:rPr>
-                        <a:t>Models</a:t>
-                      </a:r>
-                      <a:endParaRPr lang="en-US" sz="1600" b="0" dirty="0">
-                        <a:latin typeface="Arial"/>
-                        <a:cs typeface="Arial"/>
-                      </a:endParaRPr>
-                    </a:p>
-                  </a:txBody>
-                  <a:tcPr>
-                    <a:solidFill>
-                      <a:schemeClr val="bg1">
-                        <a:lumMod val="85000"/>
-                      </a:schemeClr>
-                    </a:solidFill>
-                  </a:tcPr>
-                </a:tc>
-                <a:tc>
-                  <a:txBody>
-                    <a:bodyPr/>
-                    <a:lstStyle/>
-                    <a:p>
-                      <a:pPr algn="ctr"/>
-                      <a:r>
-                        <a:rPr lang="en-US" sz="1600" b="0" dirty="0">
-                          <a:solidFill>
-                            <a:srgbClr val="0000FF"/>
+                            <a:schemeClr val="tx1"/>
                           </a:solidFill>
                           <a:latin typeface="Arial"/>
                           <a:cs typeface="Arial"/>
                         </a:rPr>
                         <a:t>Files</a:t>
                       </a:r>
-                      <a:endParaRPr lang="en-US" sz="1600" b="0" dirty="0">
-                        <a:latin typeface="Arial"/>
-                        <a:cs typeface="Arial"/>
-                      </a:endParaRPr>
                     </a:p>
                   </a:txBody>
                   <a:tcPr>
@@ -45085,7 +45183,7 @@
                       <a:r>
                         <a:rPr lang="en-US" sz="1600" b="0" dirty="0" err="1">
                           <a:solidFill>
-                            <a:srgbClr val="0000FF"/>
+                            <a:schemeClr val="tx1"/>
                           </a:solidFill>
                           <a:latin typeface="Arial"/>
                           <a:cs typeface="Arial"/>
@@ -45093,6 +45191,9 @@
                         <a:t>OutStreams</a:t>
                       </a:r>
                       <a:endParaRPr lang="en-US" sz="1600" b="0" dirty="0">
+                        <a:solidFill>
+                          <a:schemeClr val="tx1"/>
+                        </a:solidFill>
                         <a:latin typeface="Arial"/>
                         <a:cs typeface="Arial"/>
                       </a:endParaRPr>
@@ -45115,14 +45216,33 @@
                       <a:r>
                         <a:rPr lang="en-US" sz="1600" b="0" dirty="0">
                           <a:solidFill>
-                            <a:srgbClr val="0000FF"/>
+                            <a:schemeClr val="tx1"/>
                           </a:solidFill>
                           <a:latin typeface="Arial"/>
                           <a:cs typeface="Arial"/>
                         </a:rPr>
                         <a:t>Steps</a:t>
                       </a:r>
+                    </a:p>
+                  </a:txBody>
+                  <a:tcPr>
+                    <a:solidFill>
+                      <a:schemeClr val="bg1">
+                        <a:lumMod val="85000"/>
+                      </a:schemeClr>
+                    </a:solidFill>
+                  </a:tcPr>
+                </a:tc>
+                <a:tc>
+                  <a:txBody>
+                    <a:bodyPr/>
+                    <a:lstStyle/>
+                    <a:p>
+                      <a:pPr algn="ctr"/>
                       <a:endParaRPr lang="en-US" sz="1600" b="0" dirty="0">
+                        <a:solidFill>
+                          <a:schemeClr val="tx1"/>
+                        </a:solidFill>
                         <a:latin typeface="Arial"/>
                         <a:cs typeface="Arial"/>
                       </a:endParaRPr>
@@ -45143,6 +45263,9 @@
                     <a:p>
                       <a:pPr algn="ctr"/>
                       <a:endParaRPr lang="en-US" sz="1600" b="0" dirty="0">
+                        <a:solidFill>
+                          <a:schemeClr val="tx1"/>
+                        </a:solidFill>
                         <a:latin typeface="Arial"/>
                         <a:cs typeface="Arial"/>
                       </a:endParaRPr>
@@ -45163,6 +45286,9 @@
                     <a:p>
                       <a:pPr algn="ctr"/>
                       <a:endParaRPr lang="en-US" sz="1600" b="0" dirty="0">
+                        <a:solidFill>
+                          <a:schemeClr val="tx1"/>
+                        </a:solidFill>
                         <a:latin typeface="Arial"/>
                         <a:cs typeface="Arial"/>
                       </a:endParaRPr>
@@ -45183,26 +45309,9 @@
                     <a:p>
                       <a:pPr algn="ctr"/>
                       <a:endParaRPr lang="en-US" sz="1600" b="0" dirty="0">
-                        <a:latin typeface="Arial"/>
-                        <a:cs typeface="Arial"/>
-                      </a:endParaRPr>
-                    </a:p>
-                  </a:txBody>
-                  <a:tcPr>
-                    <a:solidFill>
-                      <a:schemeClr val="bg1">
-                        <a:lumMod val="85000"/>
-                      </a:schemeClr>
-                    </a:solidFill>
-                  </a:tcPr>
-                </a:tc>
-                <a:tc>
-                  <a:txBody>
-                    <a:bodyPr/>
-                    <a:lstStyle/>
-                    <a:p>
-                      <a:pPr algn="ctr"/>
-                      <a:endParaRPr lang="en-US" sz="1600" b="0" dirty="0">
+                        <a:solidFill>
+                          <a:schemeClr val="tx1"/>
+                        </a:solidFill>
                         <a:latin typeface="Arial"/>
                         <a:cs typeface="Arial"/>
                       </a:endParaRPr>
@@ -45226,6 +45335,44 @@
           </a:graphicData>
         </a:graphic>
       </p:graphicFrame>
+      <p:sp>
+        <p:nvSpPr>
+          <p:cNvPr id="5" name="TextBox 4">
+            <a:extLst>
+              <a:ext uri="{FF2B5EF4-FFF2-40B4-BE49-F238E27FC236}">
+                <a16:creationId xmlns:a16="http://schemas.microsoft.com/office/drawing/2014/main" id="{27A9A636-B165-2D43-BB33-763EDC56F6FD}"/>
+              </a:ext>
+            </a:extLst>
+          </p:cNvPr>
+          <p:cNvSpPr txBox="1"/>
+          <p:nvPr/>
+        </p:nvSpPr>
+        <p:spPr>
+          <a:xfrm>
+            <a:off x="0" y="6553200"/>
+            <a:ext cx="9144000" cy="307777"/>
+          </a:xfrm>
+          <a:prstGeom prst="rect">
+            <a:avLst/>
+          </a:prstGeom>
+          <a:noFill/>
+        </p:spPr>
+        <p:txBody>
+          <a:bodyPr wrap="square" rtlCol="0">
+            <a:spAutoFit/>
+          </a:bodyPr>
+          <a:lstStyle/>
+          <a:p>
+            <a:pPr algn="ctr"/>
+            <a:r>
+              <a:rPr lang="en-US" sz="1400" dirty="0">
+                <a:latin typeface="+mn-lt"/>
+              </a:rPr>
+              <a:t>Input file name: ForwardSampling5.xml</a:t>
+            </a:r>
+          </a:p>
+        </p:txBody>
+      </p:sp>
     </p:spTree>
     <p:extLst>
       <p:ext uri="{BB962C8B-B14F-4D97-AF65-F5344CB8AC3E}">
@@ -45290,7 +45437,7 @@
           <a:p>
             <a:r>
               <a:rPr lang="en-US" b="0" dirty="0"/>
-              <a:t>Adding a post processor action (test5.xml)</a:t>
+              <a:t>Adding a post processor action</a:t>
             </a:r>
           </a:p>
         </p:txBody>
@@ -45607,7 +45754,7 @@
           <p:nvPr>
             <p:extLst>
               <p:ext uri="{D42A27DB-BD31-4B8C-83A1-F6EECF244321}">
-                <p14:modId xmlns:p14="http://schemas.microsoft.com/office/powerpoint/2010/main" val="1752728706"/>
+                <p14:modId xmlns:p14="http://schemas.microsoft.com/office/powerpoint/2010/main" val="1342216127"/>
               </p:ext>
             </p:extLst>
           </p:nvPr>
@@ -45676,7 +45823,7 @@
                       <a:r>
                         <a:rPr lang="en-US" sz="1600" b="0" dirty="0" err="1">
                           <a:solidFill>
-                            <a:srgbClr val="0000FF"/>
+                            <a:schemeClr val="tx1"/>
                           </a:solidFill>
                           <a:latin typeface="Arial"/>
                           <a:cs typeface="Arial"/>
@@ -45685,7 +45832,7 @@
                       </a:r>
                       <a:endParaRPr lang="en-US" sz="1600" b="0" dirty="0">
                         <a:solidFill>
-                          <a:srgbClr val="0000FF"/>
+                          <a:schemeClr val="tx1"/>
                         </a:solidFill>
                         <a:latin typeface="Arial"/>
                         <a:cs typeface="Arial"/>
@@ -45709,14 +45856,69 @@
                       <a:r>
                         <a:rPr lang="en-US" sz="1600" b="0" dirty="0">
                           <a:solidFill>
-                            <a:srgbClr val="0000FF"/>
+                            <a:schemeClr val="tx1"/>
                           </a:solidFill>
                           <a:latin typeface="Arial"/>
                           <a:cs typeface="Arial"/>
                         </a:rPr>
                         <a:t>Distributions</a:t>
                       </a:r>
+                    </a:p>
+                  </a:txBody>
+                  <a:tcPr>
+                    <a:solidFill>
+                      <a:schemeClr val="bg1">
+                        <a:lumMod val="85000"/>
+                      </a:schemeClr>
+                    </a:solidFill>
+                  </a:tcPr>
+                </a:tc>
+                <a:tc>
+                  <a:txBody>
+                    <a:bodyPr/>
+                    <a:lstStyle/>
+                    <a:p>
+                      <a:pPr algn="ctr"/>
+                      <a:r>
+                        <a:rPr lang="en-US" sz="1600" b="0" dirty="0">
+                          <a:solidFill>
+                            <a:schemeClr val="tx1"/>
+                          </a:solidFill>
+                          <a:latin typeface="Arial"/>
+                          <a:cs typeface="Arial"/>
+                        </a:rPr>
+                        <a:t>Samplers</a:t>
+                      </a:r>
+                    </a:p>
+                  </a:txBody>
+                  <a:tcPr>
+                    <a:solidFill>
+                      <a:schemeClr val="bg1">
+                        <a:lumMod val="85000"/>
+                      </a:schemeClr>
+                    </a:solidFill>
+                  </a:tcPr>
+                </a:tc>
+                <a:tc>
+                  <a:txBody>
+                    <a:bodyPr/>
+                    <a:lstStyle/>
+                    <a:p>
+                      <a:pPr algn="ctr"/>
+                      <a:r>
+                        <a:rPr lang="en-US" sz="1600" b="0" dirty="0" err="1">
+                          <a:solidFill>
+                            <a:schemeClr val="tx1"/>
+                          </a:solidFill>
+                          <a:latin typeface="Arial"/>
+                          <a:cs typeface="Arial"/>
+                        </a:rPr>
+                        <a:t>DataObjects</a:t>
+                      </a:r>
                       <a:endParaRPr lang="en-US" sz="1600" b="0" dirty="0">
+                        <a:solidFill>
+                          <a:schemeClr val="tx1"/>
+                        </a:solidFill>
                         <a:latin typeface="Arial"/>
                         <a:cs typeface="Arial"/>
                       </a:endParaRPr>
@@ -45739,77 +45941,13 @@
                       <a:r>
                         <a:rPr lang="en-US" sz="1600" b="0" dirty="0">
                           <a:solidFill>
-                            <a:srgbClr val="0000FF"/>
-                          </a:solidFill>
-                          <a:latin typeface="Arial"/>
-                          <a:cs typeface="Arial"/>
-                        </a:rPr>
-                        <a:t>Samplers</a:t>
-                      </a:r>
-                      <a:endParaRPr lang="en-US" sz="1600" b="0" dirty="0">
-                        <a:latin typeface="Arial"/>
-                        <a:cs typeface="Arial"/>
-                      </a:endParaRPr>
-                    </a:p>
-                  </a:txBody>
-                  <a:tcPr>
-                    <a:solidFill>
-                      <a:schemeClr val="bg1">
-                        <a:lumMod val="85000"/>
-                      </a:schemeClr>
-                    </a:solidFill>
-                  </a:tcPr>
-                </a:tc>
-                <a:tc>
-                  <a:txBody>
-                    <a:bodyPr/>
-                    <a:lstStyle/>
-                    <a:p>
-                      <a:pPr algn="ctr"/>
-                      <a:r>
-                        <a:rPr lang="en-US" sz="1600" b="0" dirty="0" err="1">
-                          <a:solidFill>
-                            <a:srgbClr val="0000FF"/>
-                          </a:solidFill>
-                          <a:latin typeface="Arial"/>
-                          <a:cs typeface="Arial"/>
-                        </a:rPr>
-                        <a:t>DataObjects</a:t>
-                      </a:r>
-                      <a:endParaRPr lang="en-US" sz="1600" b="0" dirty="0">
-                        <a:latin typeface="Arial"/>
-                        <a:cs typeface="Arial"/>
-                      </a:endParaRPr>
-                    </a:p>
-                  </a:txBody>
-                  <a:tcPr>
-                    <a:solidFill>
-                      <a:schemeClr val="bg1">
-                        <a:lumMod val="85000"/>
-                      </a:schemeClr>
-                    </a:solidFill>
-                  </a:tcPr>
-                </a:tc>
-                <a:tc>
-                  <a:txBody>
-                    <a:bodyPr/>
-                    <a:lstStyle/>
-                    <a:p>
-                      <a:pPr algn="ctr"/>
-                      <a:r>
-                        <a:rPr lang="en-US" sz="1600" b="0" dirty="0">
-                          <a:solidFill>
-                            <a:srgbClr val="0000FF"/>
+                            <a:schemeClr val="tx1"/>
                           </a:solidFill>
                           <a:latin typeface="Arial"/>
                           <a:cs typeface="Arial"/>
                         </a:rPr>
                         <a:t>Models</a:t>
                       </a:r>
-                      <a:endParaRPr lang="en-US" sz="1600" b="0" dirty="0">
-                        <a:latin typeface="Arial"/>
-                        <a:cs typeface="Arial"/>
-                      </a:endParaRPr>
                     </a:p>
                   </a:txBody>
                   <a:tcPr>
@@ -45829,17 +45967,13 @@
                       <a:r>
                         <a:rPr lang="en-US" sz="1600" b="0" dirty="0">
                           <a:solidFill>
-                            <a:srgbClr val="0000FF"/>
+                            <a:schemeClr val="tx1"/>
                           </a:solidFill>
                           <a:latin typeface="Arial"/>
                           <a:cs typeface="Arial"/>
                         </a:rPr>
                         <a:t>Files</a:t>
                       </a:r>
-                      <a:endParaRPr lang="en-US" sz="1600" b="0" dirty="0">
-                        <a:latin typeface="Arial"/>
-                        <a:cs typeface="Arial"/>
-                      </a:endParaRPr>
                     </a:p>
                   </a:txBody>
                   <a:tcPr>
@@ -45866,7 +46000,7 @@
                       <a:r>
                         <a:rPr lang="en-US" sz="1600" b="0" dirty="0" err="1">
                           <a:solidFill>
-                            <a:srgbClr val="0000FF"/>
+                            <a:schemeClr val="tx1"/>
                           </a:solidFill>
                           <a:latin typeface="Arial"/>
                           <a:cs typeface="Arial"/>
@@ -45874,6 +46008,9 @@
                         <a:t>OutStreams</a:t>
                       </a:r>
                       <a:endParaRPr lang="en-US" sz="1600" b="0" dirty="0">
+                        <a:solidFill>
+                          <a:schemeClr val="tx1"/>
+                        </a:solidFill>
                         <a:latin typeface="Arial"/>
                         <a:cs typeface="Arial"/>
                       </a:endParaRPr>
@@ -45896,14 +46033,33 @@
                       <a:r>
                         <a:rPr lang="en-US" sz="1600" b="0" dirty="0">
                           <a:solidFill>
-                            <a:srgbClr val="0000FF"/>
+                            <a:schemeClr val="tx1"/>
                           </a:solidFill>
                           <a:latin typeface="Arial"/>
                           <a:cs typeface="Arial"/>
                         </a:rPr>
                         <a:t>Steps</a:t>
                       </a:r>
+                    </a:p>
+                  </a:txBody>
+                  <a:tcPr>
+                    <a:solidFill>
+                      <a:schemeClr val="bg1">
+                        <a:lumMod val="85000"/>
+                      </a:schemeClr>
+                    </a:solidFill>
+                  </a:tcPr>
+                </a:tc>
+                <a:tc>
+                  <a:txBody>
+                    <a:bodyPr/>
+                    <a:lstStyle/>
+                    <a:p>
+                      <a:pPr algn="ctr"/>
                       <a:endParaRPr lang="en-US" sz="1600" b="0" dirty="0">
+                        <a:solidFill>
+                          <a:schemeClr val="tx1"/>
+                        </a:solidFill>
                         <a:latin typeface="Arial"/>
                         <a:cs typeface="Arial"/>
                       </a:endParaRPr>
@@ -45924,6 +46080,9 @@
                     <a:p>
                       <a:pPr algn="ctr"/>
                       <a:endParaRPr lang="en-US" sz="1600" b="0" dirty="0">
+                        <a:solidFill>
+                          <a:schemeClr val="tx1"/>
+                        </a:solidFill>
                         <a:latin typeface="Arial"/>
                         <a:cs typeface="Arial"/>
                       </a:endParaRPr>
@@ -45944,6 +46103,9 @@
                     <a:p>
                       <a:pPr algn="ctr"/>
                       <a:endParaRPr lang="en-US" sz="1600" b="0" dirty="0">
+                        <a:solidFill>
+                          <a:schemeClr val="tx1"/>
+                        </a:solidFill>
                         <a:latin typeface="Arial"/>
                         <a:cs typeface="Arial"/>
                       </a:endParaRPr>
@@ -45964,26 +46126,9 @@
                     <a:p>
                       <a:pPr algn="ctr"/>
                       <a:endParaRPr lang="en-US" sz="1600" b="0" dirty="0">
-                        <a:latin typeface="Arial"/>
-                        <a:cs typeface="Arial"/>
-                      </a:endParaRPr>
-                    </a:p>
-                  </a:txBody>
-                  <a:tcPr>
-                    <a:solidFill>
-                      <a:schemeClr val="bg1">
-                        <a:lumMod val="85000"/>
-                      </a:schemeClr>
-                    </a:solidFill>
-                  </a:tcPr>
-                </a:tc>
-                <a:tc>
-                  <a:txBody>
-                    <a:bodyPr/>
-                    <a:lstStyle/>
-                    <a:p>
-                      <a:pPr algn="ctr"/>
-                      <a:endParaRPr lang="en-US" sz="1600" b="0" dirty="0">
+                        <a:solidFill>
+                          <a:schemeClr val="tx1"/>
+                        </a:solidFill>
                         <a:latin typeface="Arial"/>
                         <a:cs typeface="Arial"/>
                       </a:endParaRPr>
@@ -46007,6 +46152,44 @@
           </a:graphicData>
         </a:graphic>
       </p:graphicFrame>
+      <p:sp>
+        <p:nvSpPr>
+          <p:cNvPr id="5" name="TextBox 4">
+            <a:extLst>
+              <a:ext uri="{FF2B5EF4-FFF2-40B4-BE49-F238E27FC236}">
+                <a16:creationId xmlns:a16="http://schemas.microsoft.com/office/drawing/2014/main" id="{A868DFA4-F299-184F-A8EF-3334A4FA2BA9}"/>
+              </a:ext>
+            </a:extLst>
+          </p:cNvPr>
+          <p:cNvSpPr txBox="1"/>
+          <p:nvPr/>
+        </p:nvSpPr>
+        <p:spPr>
+          <a:xfrm>
+            <a:off x="0" y="6553200"/>
+            <a:ext cx="9144000" cy="307777"/>
+          </a:xfrm>
+          <a:prstGeom prst="rect">
+            <a:avLst/>
+          </a:prstGeom>
+          <a:noFill/>
+        </p:spPr>
+        <p:txBody>
+          <a:bodyPr wrap="square" rtlCol="0">
+            <a:spAutoFit/>
+          </a:bodyPr>
+          <a:lstStyle/>
+          <a:p>
+            <a:pPr algn="ctr"/>
+            <a:r>
+              <a:rPr lang="en-US" sz="1400" dirty="0">
+                <a:latin typeface="+mn-lt"/>
+              </a:rPr>
+              <a:t>Input file name: ForwardSampling5.xml</a:t>
+            </a:r>
+          </a:p>
+        </p:txBody>
+      </p:sp>
     </p:spTree>
     <p:extLst>
       <p:ext uri="{BB962C8B-B14F-4D97-AF65-F5344CB8AC3E}">
@@ -46071,7 +46254,7 @@
           <a:p>
             <a:r>
               <a:rPr lang="en-US" b="0" dirty="0"/>
-              <a:t>Adding Export File (test5.xml)</a:t>
+              <a:t>Adding Export File</a:t>
             </a:r>
           </a:p>
         </p:txBody>
@@ -46235,7 +46418,7 @@
           <p:nvPr>
             <p:extLst>
               <p:ext uri="{D42A27DB-BD31-4B8C-83A1-F6EECF244321}">
-                <p14:modId xmlns:p14="http://schemas.microsoft.com/office/powerpoint/2010/main" val="465513731"/>
+                <p14:modId xmlns:p14="http://schemas.microsoft.com/office/powerpoint/2010/main" val="680980486"/>
               </p:ext>
             </p:extLst>
           </p:nvPr>
@@ -46304,7 +46487,7 @@
                       <a:r>
                         <a:rPr lang="en-US" sz="1600" b="0" dirty="0" err="1">
                           <a:solidFill>
-                            <a:srgbClr val="0000FF"/>
+                            <a:schemeClr val="tx1"/>
                           </a:solidFill>
                           <a:latin typeface="Arial"/>
                           <a:cs typeface="Arial"/>
@@ -46313,7 +46496,7 @@
                       </a:r>
                       <a:endParaRPr lang="en-US" sz="1600" b="0" dirty="0">
                         <a:solidFill>
-                          <a:srgbClr val="0000FF"/>
+                          <a:schemeClr val="tx1"/>
                         </a:solidFill>
                         <a:latin typeface="Arial"/>
                         <a:cs typeface="Arial"/>
@@ -46337,14 +46520,69 @@
                       <a:r>
                         <a:rPr lang="en-US" sz="1600" b="0" dirty="0">
                           <a:solidFill>
-                            <a:srgbClr val="0000FF"/>
+                            <a:schemeClr val="tx1"/>
                           </a:solidFill>
                           <a:latin typeface="Arial"/>
                           <a:cs typeface="Arial"/>
                         </a:rPr>
                         <a:t>Distributions</a:t>
                       </a:r>
+                    </a:p>
+                  </a:txBody>
+                  <a:tcPr>
+                    <a:solidFill>
+                      <a:schemeClr val="bg1">
+                        <a:lumMod val="85000"/>
+                      </a:schemeClr>
+                    </a:solidFill>
+                  </a:tcPr>
+                </a:tc>
+                <a:tc>
+                  <a:txBody>
+                    <a:bodyPr/>
+                    <a:lstStyle/>
+                    <a:p>
+                      <a:pPr algn="ctr"/>
+                      <a:r>
+                        <a:rPr lang="en-US" sz="1600" b="0" dirty="0">
+                          <a:solidFill>
+                            <a:schemeClr val="tx1"/>
+                          </a:solidFill>
+                          <a:latin typeface="Arial"/>
+                          <a:cs typeface="Arial"/>
+                        </a:rPr>
+                        <a:t>Samplers</a:t>
+                      </a:r>
+                    </a:p>
+                  </a:txBody>
+                  <a:tcPr>
+                    <a:solidFill>
+                      <a:schemeClr val="bg1">
+                        <a:lumMod val="85000"/>
+                      </a:schemeClr>
+                    </a:solidFill>
+                  </a:tcPr>
+                </a:tc>
+                <a:tc>
+                  <a:txBody>
+                    <a:bodyPr/>
+                    <a:lstStyle/>
+                    <a:p>
+                      <a:pPr algn="ctr"/>
+                      <a:r>
+                        <a:rPr lang="en-US" sz="1600" b="0" dirty="0" err="1">
+                          <a:solidFill>
+                            <a:schemeClr val="tx1"/>
+                          </a:solidFill>
+                          <a:latin typeface="Arial"/>
+                          <a:cs typeface="Arial"/>
+                        </a:rPr>
+                        <a:t>DataObjects</a:t>
+                      </a:r>
                       <a:endParaRPr lang="en-US" sz="1600" b="0" dirty="0">
+                        <a:solidFill>
+                          <a:schemeClr val="tx1"/>
+                        </a:solidFill>
                         <a:latin typeface="Arial"/>
                         <a:cs typeface="Arial"/>
                       </a:endParaRPr>
@@ -46367,47 +46605,13 @@
                       <a:r>
                         <a:rPr lang="en-US" sz="1600" b="0" dirty="0">
                           <a:solidFill>
-                            <a:srgbClr val="0000FF"/>
+                            <a:schemeClr val="tx1"/>
                           </a:solidFill>
                           <a:latin typeface="Arial"/>
                           <a:cs typeface="Arial"/>
                         </a:rPr>
-                        <a:t>Samplers</a:t>
+                        <a:t>Models</a:t>
                       </a:r>
-                      <a:endParaRPr lang="en-US" sz="1600" b="0" dirty="0">
-                        <a:latin typeface="Arial"/>
-                        <a:cs typeface="Arial"/>
-                      </a:endParaRPr>
-                    </a:p>
-                  </a:txBody>
-                  <a:tcPr>
-                    <a:solidFill>
-                      <a:schemeClr val="bg1">
-                        <a:lumMod val="85000"/>
-                      </a:schemeClr>
-                    </a:solidFill>
-                  </a:tcPr>
-                </a:tc>
-                <a:tc>
-                  <a:txBody>
-                    <a:bodyPr/>
-                    <a:lstStyle/>
-                    <a:p>
-                      <a:pPr algn="ctr"/>
-                      <a:r>
-                        <a:rPr lang="en-US" sz="1600" b="0" dirty="0" err="1">
-                          <a:solidFill>
-                            <a:srgbClr val="0000FF"/>
-                          </a:solidFill>
-                          <a:latin typeface="Arial"/>
-                          <a:cs typeface="Arial"/>
-                        </a:rPr>
-                        <a:t>DataObjects</a:t>
-                      </a:r>
-                      <a:endParaRPr lang="en-US" sz="1600" b="0" dirty="0">
-                        <a:latin typeface="Arial"/>
-                        <a:cs typeface="Arial"/>
-                      </a:endParaRPr>
                     </a:p>
                   </a:txBody>
                   <a:tcPr>
@@ -46427,47 +46631,13 @@
                       <a:r>
                         <a:rPr lang="en-US" sz="1600" b="0" dirty="0">
                           <a:solidFill>
-                            <a:srgbClr val="0000FF"/>
-                          </a:solidFill>
-                          <a:latin typeface="Arial"/>
-                          <a:cs typeface="Arial"/>
-                        </a:rPr>
-                        <a:t>Models</a:t>
-                      </a:r>
-                      <a:endParaRPr lang="en-US" sz="1600" b="0" dirty="0">
-                        <a:latin typeface="Arial"/>
-                        <a:cs typeface="Arial"/>
-                      </a:endParaRPr>
-                    </a:p>
-                  </a:txBody>
-                  <a:tcPr>
-                    <a:solidFill>
-                      <a:schemeClr val="bg1">
-                        <a:lumMod val="85000"/>
-                      </a:schemeClr>
-                    </a:solidFill>
-                  </a:tcPr>
-                </a:tc>
-                <a:tc>
-                  <a:txBody>
-                    <a:bodyPr/>
-                    <a:lstStyle/>
-                    <a:p>
-                      <a:pPr algn="ctr"/>
-                      <a:r>
-                        <a:rPr lang="en-US" sz="1600" b="0" dirty="0">
-                          <a:solidFill>
-                            <a:srgbClr val="0000FF"/>
+                            <a:schemeClr val="tx1"/>
                           </a:solidFill>
                           <a:latin typeface="Arial"/>
                           <a:cs typeface="Arial"/>
                         </a:rPr>
                         <a:t>Files</a:t>
                       </a:r>
-                      <a:endParaRPr lang="en-US" sz="1600" b="0" dirty="0">
-                        <a:latin typeface="Arial"/>
-                        <a:cs typeface="Arial"/>
-                      </a:endParaRPr>
                     </a:p>
                   </a:txBody>
                   <a:tcPr>
@@ -46494,7 +46664,7 @@
                       <a:r>
                         <a:rPr lang="en-US" sz="1600" b="0" dirty="0" err="1">
                           <a:solidFill>
-                            <a:srgbClr val="0000FF"/>
+                            <a:schemeClr val="tx1"/>
                           </a:solidFill>
                           <a:latin typeface="Arial"/>
                           <a:cs typeface="Arial"/>
@@ -46502,6 +46672,9 @@
                         <a:t>OutStreams</a:t>
                       </a:r>
                       <a:endParaRPr lang="en-US" sz="1600" b="0" dirty="0">
+                        <a:solidFill>
+                          <a:schemeClr val="tx1"/>
+                        </a:solidFill>
                         <a:latin typeface="Arial"/>
                         <a:cs typeface="Arial"/>
                       </a:endParaRPr>
@@ -46524,14 +46697,33 @@
                       <a:r>
                         <a:rPr lang="en-US" sz="1600" b="0" dirty="0">
                           <a:solidFill>
-                            <a:srgbClr val="0000FF"/>
+                            <a:schemeClr val="tx1"/>
                           </a:solidFill>
                           <a:latin typeface="Arial"/>
                           <a:cs typeface="Arial"/>
                         </a:rPr>
                         <a:t>Steps</a:t>
                       </a:r>
+                    </a:p>
+                  </a:txBody>
+                  <a:tcPr>
+                    <a:solidFill>
+                      <a:schemeClr val="bg1">
+                        <a:lumMod val="85000"/>
+                      </a:schemeClr>
+                    </a:solidFill>
+                  </a:tcPr>
+                </a:tc>
+                <a:tc>
+                  <a:txBody>
+                    <a:bodyPr/>
+                    <a:lstStyle/>
+                    <a:p>
+                      <a:pPr algn="ctr"/>
                       <a:endParaRPr lang="en-US" sz="1600" b="0" dirty="0">
+                        <a:solidFill>
+                          <a:schemeClr val="tx1"/>
+                        </a:solidFill>
                         <a:latin typeface="Arial"/>
                         <a:cs typeface="Arial"/>
                       </a:endParaRPr>
@@ -46552,6 +46744,9 @@
                     <a:p>
                       <a:pPr algn="ctr"/>
                       <a:endParaRPr lang="en-US" sz="1600" b="0" dirty="0">
+                        <a:solidFill>
+                          <a:schemeClr val="tx1"/>
+                        </a:solidFill>
                         <a:latin typeface="Arial"/>
                         <a:cs typeface="Arial"/>
                       </a:endParaRPr>
@@ -46572,6 +46767,9 @@
                     <a:p>
                       <a:pPr algn="ctr"/>
                       <a:endParaRPr lang="en-US" sz="1600" b="0" dirty="0">
+                        <a:solidFill>
+                          <a:schemeClr val="tx1"/>
+                        </a:solidFill>
                         <a:latin typeface="Arial"/>
                         <a:cs typeface="Arial"/>
                       </a:endParaRPr>
@@ -46592,26 +46790,9 @@
                     <a:p>
                       <a:pPr algn="ctr"/>
                       <a:endParaRPr lang="en-US" sz="1600" b="0" dirty="0">
-                        <a:latin typeface="Arial"/>
-                        <a:cs typeface="Arial"/>
-                      </a:endParaRPr>
-                    </a:p>
-                  </a:txBody>
-                  <a:tcPr>
-                    <a:solidFill>
-                      <a:schemeClr val="bg1">
-                        <a:lumMod val="85000"/>
-                      </a:schemeClr>
-                    </a:solidFill>
-                  </a:tcPr>
-                </a:tc>
-                <a:tc>
-                  <a:txBody>
-                    <a:bodyPr/>
-                    <a:lstStyle/>
-                    <a:p>
-                      <a:pPr algn="ctr"/>
-                      <a:endParaRPr lang="en-US" sz="1600" b="0" dirty="0">
+                        <a:solidFill>
+                          <a:schemeClr val="tx1"/>
+                        </a:solidFill>
                         <a:latin typeface="Arial"/>
                         <a:cs typeface="Arial"/>
                       </a:endParaRPr>
@@ -46635,6 +46816,44 @@
           </a:graphicData>
         </a:graphic>
       </p:graphicFrame>
+      <p:sp>
+        <p:nvSpPr>
+          <p:cNvPr id="5" name="TextBox 4">
+            <a:extLst>
+              <a:ext uri="{FF2B5EF4-FFF2-40B4-BE49-F238E27FC236}">
+                <a16:creationId xmlns:a16="http://schemas.microsoft.com/office/drawing/2014/main" id="{22035192-7F34-FE42-B9F6-7A144E12CFCF}"/>
+              </a:ext>
+            </a:extLst>
+          </p:cNvPr>
+          <p:cNvSpPr txBox="1"/>
+          <p:nvPr/>
+        </p:nvSpPr>
+        <p:spPr>
+          <a:xfrm>
+            <a:off x="0" y="6553200"/>
+            <a:ext cx="9144000" cy="307777"/>
+          </a:xfrm>
+          <a:prstGeom prst="rect">
+            <a:avLst/>
+          </a:prstGeom>
+          <a:noFill/>
+        </p:spPr>
+        <p:txBody>
+          <a:bodyPr wrap="square" rtlCol="0">
+            <a:spAutoFit/>
+          </a:bodyPr>
+          <a:lstStyle/>
+          <a:p>
+            <a:pPr algn="ctr"/>
+            <a:r>
+              <a:rPr lang="en-US" sz="1400" dirty="0">
+                <a:latin typeface="+mn-lt"/>
+              </a:rPr>
+              <a:t>Input file name: ForwardSampling5.xml</a:t>
+            </a:r>
+          </a:p>
+        </p:txBody>
+      </p:sp>
     </p:spTree>
     <p:extLst>
       <p:ext uri="{BB962C8B-B14F-4D97-AF65-F5344CB8AC3E}">
@@ -46712,7 +46931,7 @@
         </p:nvSpPr>
         <p:spPr>
           <a:xfrm>
-            <a:off x="283275" y="2880743"/>
+            <a:off x="283275" y="2326550"/>
             <a:ext cx="8689594" cy="3893374"/>
           </a:xfrm>
           <a:prstGeom prst="rect">
@@ -47786,7 +48005,7 @@
           <p:nvPr>
             <p:extLst>
               <p:ext uri="{D42A27DB-BD31-4B8C-83A1-F6EECF244321}">
-                <p14:modId xmlns:p14="http://schemas.microsoft.com/office/powerpoint/2010/main" val="3068459584"/>
+                <p14:modId xmlns:p14="http://schemas.microsoft.com/office/powerpoint/2010/main" val="748644176"/>
               </p:ext>
             </p:extLst>
           </p:nvPr>
@@ -47855,7 +48074,7 @@
                       <a:r>
                         <a:rPr lang="en-US" sz="1600" b="0" dirty="0" err="1">
                           <a:solidFill>
-                            <a:srgbClr val="0000FF"/>
+                            <a:schemeClr val="tx1"/>
                           </a:solidFill>
                           <a:latin typeface="Arial"/>
                           <a:cs typeface="Arial"/>
@@ -47864,7 +48083,7 @@
                       </a:r>
                       <a:endParaRPr lang="en-US" sz="1600" b="0" dirty="0">
                         <a:solidFill>
-                          <a:srgbClr val="0000FF"/>
+                          <a:schemeClr val="tx1"/>
                         </a:solidFill>
                         <a:latin typeface="Arial"/>
                         <a:cs typeface="Arial"/>
@@ -47888,14 +48107,69 @@
                       <a:r>
                         <a:rPr lang="en-US" sz="1600" b="0" dirty="0">
                           <a:solidFill>
-                            <a:srgbClr val="0000FF"/>
+                            <a:schemeClr val="tx1"/>
                           </a:solidFill>
                           <a:latin typeface="Arial"/>
                           <a:cs typeface="Arial"/>
                         </a:rPr>
                         <a:t>Distributions</a:t>
                       </a:r>
+                    </a:p>
+                  </a:txBody>
+                  <a:tcPr>
+                    <a:solidFill>
+                      <a:schemeClr val="bg1">
+                        <a:lumMod val="85000"/>
+                      </a:schemeClr>
+                    </a:solidFill>
+                  </a:tcPr>
+                </a:tc>
+                <a:tc>
+                  <a:txBody>
+                    <a:bodyPr/>
+                    <a:lstStyle/>
+                    <a:p>
+                      <a:pPr algn="ctr"/>
+                      <a:r>
+                        <a:rPr lang="en-US" sz="1600" b="0" dirty="0">
+                          <a:solidFill>
+                            <a:schemeClr val="tx1"/>
+                          </a:solidFill>
+                          <a:latin typeface="Arial"/>
+                          <a:cs typeface="Arial"/>
+                        </a:rPr>
+                        <a:t>Samplers</a:t>
+                      </a:r>
+                    </a:p>
+                  </a:txBody>
+                  <a:tcPr>
+                    <a:solidFill>
+                      <a:schemeClr val="bg1">
+                        <a:lumMod val="85000"/>
+                      </a:schemeClr>
+                    </a:solidFill>
+                  </a:tcPr>
+                </a:tc>
+                <a:tc>
+                  <a:txBody>
+                    <a:bodyPr/>
+                    <a:lstStyle/>
+                    <a:p>
+                      <a:pPr algn="ctr"/>
+                      <a:r>
+                        <a:rPr lang="en-US" sz="1600" b="0" dirty="0" err="1">
+                          <a:solidFill>
+                            <a:schemeClr val="tx1"/>
+                          </a:solidFill>
+                          <a:latin typeface="Arial"/>
+                          <a:cs typeface="Arial"/>
+                        </a:rPr>
+                        <a:t>DataObjects</a:t>
+                      </a:r>
                       <a:endParaRPr lang="en-US" sz="1600" b="0" dirty="0">
+                        <a:solidFill>
+                          <a:schemeClr val="tx1"/>
+                        </a:solidFill>
                         <a:latin typeface="Arial"/>
                         <a:cs typeface="Arial"/>
                       </a:endParaRPr>
@@ -47918,47 +48192,13 @@
                       <a:r>
                         <a:rPr lang="en-US" sz="1600" b="0" dirty="0">
                           <a:solidFill>
-                            <a:srgbClr val="0000FF"/>
+                            <a:schemeClr val="tx1"/>
                           </a:solidFill>
                           <a:latin typeface="Arial"/>
                           <a:cs typeface="Arial"/>
                         </a:rPr>
-                        <a:t>Samplers</a:t>
+                        <a:t>Models</a:t>
                       </a:r>
-                      <a:endParaRPr lang="en-US" sz="1600" b="0" dirty="0">
-                        <a:latin typeface="Arial"/>
-                        <a:cs typeface="Arial"/>
-                      </a:endParaRPr>
-                    </a:p>
-                  </a:txBody>
-                  <a:tcPr>
-                    <a:solidFill>
-                      <a:schemeClr val="bg1">
-                        <a:lumMod val="85000"/>
-                      </a:schemeClr>
-                    </a:solidFill>
-                  </a:tcPr>
-                </a:tc>
-                <a:tc>
-                  <a:txBody>
-                    <a:bodyPr/>
-                    <a:lstStyle/>
-                    <a:p>
-                      <a:pPr algn="ctr"/>
-                      <a:r>
-                        <a:rPr lang="en-US" sz="1600" b="0" dirty="0" err="1">
-                          <a:solidFill>
-                            <a:srgbClr val="0000FF"/>
-                          </a:solidFill>
-                          <a:latin typeface="Arial"/>
-                          <a:cs typeface="Arial"/>
-                        </a:rPr>
-                        <a:t>DataObjects</a:t>
-                      </a:r>
-                      <a:endParaRPr lang="en-US" sz="1600" b="0" dirty="0">
-                        <a:latin typeface="Arial"/>
-                        <a:cs typeface="Arial"/>
-                      </a:endParaRPr>
                     </a:p>
                   </a:txBody>
                   <a:tcPr>
@@ -47978,47 +48218,13 @@
                       <a:r>
                         <a:rPr lang="en-US" sz="1600" b="0" dirty="0">
                           <a:solidFill>
-                            <a:srgbClr val="0000FF"/>
-                          </a:solidFill>
-                          <a:latin typeface="Arial"/>
-                          <a:cs typeface="Arial"/>
-                        </a:rPr>
-                        <a:t>Models</a:t>
-                      </a:r>
-                      <a:endParaRPr lang="en-US" sz="1600" b="0" dirty="0">
-                        <a:latin typeface="Arial"/>
-                        <a:cs typeface="Arial"/>
-                      </a:endParaRPr>
-                    </a:p>
-                  </a:txBody>
-                  <a:tcPr>
-                    <a:solidFill>
-                      <a:schemeClr val="bg1">
-                        <a:lumMod val="85000"/>
-                      </a:schemeClr>
-                    </a:solidFill>
-                  </a:tcPr>
-                </a:tc>
-                <a:tc>
-                  <a:txBody>
-                    <a:bodyPr/>
-                    <a:lstStyle/>
-                    <a:p>
-                      <a:pPr algn="ctr"/>
-                      <a:r>
-                        <a:rPr lang="en-US" sz="1600" b="0" dirty="0">
-                          <a:solidFill>
-                            <a:srgbClr val="0000FF"/>
+                            <a:schemeClr val="tx1"/>
                           </a:solidFill>
                           <a:latin typeface="Arial"/>
                           <a:cs typeface="Arial"/>
                         </a:rPr>
                         <a:t>Files</a:t>
                       </a:r>
-                      <a:endParaRPr lang="en-US" sz="1600" b="0" dirty="0">
-                        <a:latin typeface="Arial"/>
-                        <a:cs typeface="Arial"/>
-                      </a:endParaRPr>
                     </a:p>
                   </a:txBody>
                   <a:tcPr>
@@ -48045,7 +48251,7 @@
                       <a:r>
                         <a:rPr lang="en-US" sz="1600" b="0" dirty="0" err="1">
                           <a:solidFill>
-                            <a:srgbClr val="0000FF"/>
+                            <a:schemeClr val="tx1"/>
                           </a:solidFill>
                           <a:latin typeface="Arial"/>
                           <a:cs typeface="Arial"/>
@@ -48053,6 +48259,9 @@
                         <a:t>OutStreams</a:t>
                       </a:r>
                       <a:endParaRPr lang="en-US" sz="1600" b="0" dirty="0">
+                        <a:solidFill>
+                          <a:schemeClr val="tx1"/>
+                        </a:solidFill>
                         <a:latin typeface="Arial"/>
                         <a:cs typeface="Arial"/>
                       </a:endParaRPr>
@@ -48075,17 +48284,13 @@
                       <a:r>
                         <a:rPr lang="en-US" sz="1600" b="0" dirty="0">
                           <a:solidFill>
-                            <a:srgbClr val="0000FF"/>
+                            <a:schemeClr val="tx1"/>
                           </a:solidFill>
                           <a:latin typeface="Arial"/>
                           <a:cs typeface="Arial"/>
                         </a:rPr>
                         <a:t>Steps</a:t>
                       </a:r>
-                      <a:endParaRPr lang="en-US" sz="1600" b="0" dirty="0">
-                        <a:latin typeface="Arial"/>
-                        <a:cs typeface="Arial"/>
-                      </a:endParaRPr>
                     </a:p>
                   </a:txBody>
                   <a:tcPr>
@@ -48103,6 +48308,9 @@
                     <a:p>
                       <a:pPr algn="ctr"/>
                       <a:endParaRPr lang="en-US" sz="1600" b="0" dirty="0">
+                        <a:solidFill>
+                          <a:schemeClr val="tx1"/>
+                        </a:solidFill>
                         <a:latin typeface="Arial"/>
                         <a:cs typeface="Arial"/>
                       </a:endParaRPr>
@@ -48123,6 +48331,9 @@
                     <a:p>
                       <a:pPr algn="ctr"/>
                       <a:endParaRPr lang="en-US" sz="1600" b="0" dirty="0">
+                        <a:solidFill>
+                          <a:schemeClr val="tx1"/>
+                        </a:solidFill>
                         <a:latin typeface="Arial"/>
                         <a:cs typeface="Arial"/>
                       </a:endParaRPr>
@@ -48143,6 +48354,9 @@
                     <a:p>
                       <a:pPr algn="ctr"/>
                       <a:endParaRPr lang="en-US" sz="1600" b="0" dirty="0">
+                        <a:solidFill>
+                          <a:schemeClr val="tx1"/>
+                        </a:solidFill>
                         <a:latin typeface="Arial"/>
                         <a:cs typeface="Arial"/>
                       </a:endParaRPr>
@@ -48163,6 +48377,9 @@
                     <a:p>
                       <a:pPr algn="ctr"/>
                       <a:endParaRPr lang="en-US" sz="1600" b="0" dirty="0">
+                        <a:solidFill>
+                          <a:schemeClr val="tx1"/>
+                        </a:solidFill>
                         <a:latin typeface="Arial"/>
                         <a:cs typeface="Arial"/>
                       </a:endParaRPr>
@@ -48186,6 +48403,44 @@
           </a:graphicData>
         </a:graphic>
       </p:graphicFrame>
+      <p:sp>
+        <p:nvSpPr>
+          <p:cNvPr id="5" name="TextBox 4">
+            <a:extLst>
+              <a:ext uri="{FF2B5EF4-FFF2-40B4-BE49-F238E27FC236}">
+                <a16:creationId xmlns:a16="http://schemas.microsoft.com/office/drawing/2014/main" id="{85893AF4-A5F0-B546-A9B3-2DA40067E2E9}"/>
+              </a:ext>
+            </a:extLst>
+          </p:cNvPr>
+          <p:cNvSpPr txBox="1"/>
+          <p:nvPr/>
+        </p:nvSpPr>
+        <p:spPr>
+          <a:xfrm>
+            <a:off x="0" y="6553200"/>
+            <a:ext cx="9144000" cy="307777"/>
+          </a:xfrm>
+          <a:prstGeom prst="rect">
+            <a:avLst/>
+          </a:prstGeom>
+          <a:noFill/>
+        </p:spPr>
+        <p:txBody>
+          <a:bodyPr wrap="square" rtlCol="0">
+            <a:spAutoFit/>
+          </a:bodyPr>
+          <a:lstStyle/>
+          <a:p>
+            <a:pPr algn="ctr"/>
+            <a:r>
+              <a:rPr lang="en-US" sz="1400" dirty="0">
+                <a:latin typeface="+mn-lt"/>
+              </a:rPr>
+              <a:t>Input file name: ForwardSampling5.xml</a:t>
+            </a:r>
+          </a:p>
+        </p:txBody>
+      </p:sp>
     </p:spTree>
     <p:extLst>
       <p:ext uri="{BB962C8B-B14F-4D97-AF65-F5344CB8AC3E}">
@@ -49610,7 +49865,7 @@
           <p:nvPr>
             <p:extLst>
               <p:ext uri="{D42A27DB-BD31-4B8C-83A1-F6EECF244321}">
-                <p14:modId xmlns:p14="http://schemas.microsoft.com/office/powerpoint/2010/main" val="2096481287"/>
+                <p14:modId xmlns:p14="http://schemas.microsoft.com/office/powerpoint/2010/main" val="1844823398"/>
               </p:ext>
             </p:extLst>
           </p:nvPr>
@@ -49679,7 +49934,7 @@
                       <a:r>
                         <a:rPr lang="en-US" sz="1600" b="0" dirty="0" err="1">
                           <a:solidFill>
-                            <a:srgbClr val="0000FF"/>
+                            <a:schemeClr val="tx1"/>
                           </a:solidFill>
                           <a:latin typeface="Arial"/>
                           <a:cs typeface="Arial"/>
@@ -49688,7 +49943,7 @@
                       </a:r>
                       <a:endParaRPr lang="en-US" sz="1600" b="0" dirty="0">
                         <a:solidFill>
-                          <a:srgbClr val="0000FF"/>
+                          <a:schemeClr val="tx1"/>
                         </a:solidFill>
                         <a:latin typeface="Arial"/>
                         <a:cs typeface="Arial"/>
@@ -49712,14 +49967,69 @@
                       <a:r>
                         <a:rPr lang="en-US" sz="1600" b="0" dirty="0">
                           <a:solidFill>
-                            <a:srgbClr val="0000FF"/>
+                            <a:schemeClr val="tx1"/>
                           </a:solidFill>
                           <a:latin typeface="Arial"/>
                           <a:cs typeface="Arial"/>
                         </a:rPr>
                         <a:t>Distributions</a:t>
                       </a:r>
+                    </a:p>
+                  </a:txBody>
+                  <a:tcPr>
+                    <a:solidFill>
+                      <a:schemeClr val="bg1">
+                        <a:lumMod val="85000"/>
+                      </a:schemeClr>
+                    </a:solidFill>
+                  </a:tcPr>
+                </a:tc>
+                <a:tc>
+                  <a:txBody>
+                    <a:bodyPr/>
+                    <a:lstStyle/>
+                    <a:p>
+                      <a:pPr algn="ctr"/>
+                      <a:r>
+                        <a:rPr lang="en-US" sz="1600" b="0" dirty="0">
+                          <a:solidFill>
+                            <a:schemeClr val="tx1"/>
+                          </a:solidFill>
+                          <a:latin typeface="Arial"/>
+                          <a:cs typeface="Arial"/>
+                        </a:rPr>
+                        <a:t>Samplers</a:t>
+                      </a:r>
+                    </a:p>
+                  </a:txBody>
+                  <a:tcPr>
+                    <a:solidFill>
+                      <a:schemeClr val="bg1">
+                        <a:lumMod val="85000"/>
+                      </a:schemeClr>
+                    </a:solidFill>
+                  </a:tcPr>
+                </a:tc>
+                <a:tc>
+                  <a:txBody>
+                    <a:bodyPr/>
+                    <a:lstStyle/>
+                    <a:p>
+                      <a:pPr algn="ctr"/>
+                      <a:r>
+                        <a:rPr lang="en-US" sz="1600" b="0" dirty="0" err="1">
+                          <a:solidFill>
+                            <a:schemeClr val="tx1"/>
+                          </a:solidFill>
+                          <a:latin typeface="Arial"/>
+                          <a:cs typeface="Arial"/>
+                        </a:rPr>
+                        <a:t>DataObjects</a:t>
+                      </a:r>
                       <a:endParaRPr lang="en-US" sz="1600" b="0" dirty="0">
+                        <a:solidFill>
+                          <a:schemeClr val="tx1"/>
+                        </a:solidFill>
                         <a:latin typeface="Arial"/>
                         <a:cs typeface="Arial"/>
                       </a:endParaRPr>
@@ -49742,47 +50052,13 @@
                       <a:r>
                         <a:rPr lang="en-US" sz="1600" b="0" dirty="0">
                           <a:solidFill>
-                            <a:srgbClr val="0000FF"/>
+                            <a:schemeClr val="tx1"/>
                           </a:solidFill>
                           <a:latin typeface="Arial"/>
                           <a:cs typeface="Arial"/>
                         </a:rPr>
-                        <a:t>Samplers</a:t>
+                        <a:t>Models</a:t>
                       </a:r>
-                      <a:endParaRPr lang="en-US" sz="1600" b="0" dirty="0">
-                        <a:latin typeface="Arial"/>
-                        <a:cs typeface="Arial"/>
-                      </a:endParaRPr>
-                    </a:p>
-                  </a:txBody>
-                  <a:tcPr>
-                    <a:solidFill>
-                      <a:schemeClr val="bg1">
-                        <a:lumMod val="85000"/>
-                      </a:schemeClr>
-                    </a:solidFill>
-                  </a:tcPr>
-                </a:tc>
-                <a:tc>
-                  <a:txBody>
-                    <a:bodyPr/>
-                    <a:lstStyle/>
-                    <a:p>
-                      <a:pPr algn="ctr"/>
-                      <a:r>
-                        <a:rPr lang="en-US" sz="1600" b="0" dirty="0" err="1">
-                          <a:solidFill>
-                            <a:srgbClr val="0000FF"/>
-                          </a:solidFill>
-                          <a:latin typeface="Arial"/>
-                          <a:cs typeface="Arial"/>
-                        </a:rPr>
-                        <a:t>DataObjects</a:t>
-                      </a:r>
-                      <a:endParaRPr lang="en-US" sz="1600" b="0" dirty="0">
-                        <a:latin typeface="Arial"/>
-                        <a:cs typeface="Arial"/>
-                      </a:endParaRPr>
                     </a:p>
                   </a:txBody>
                   <a:tcPr>
@@ -49802,47 +50078,13 @@
                       <a:r>
                         <a:rPr lang="en-US" sz="1600" b="0" dirty="0">
                           <a:solidFill>
-                            <a:srgbClr val="0000FF"/>
-                          </a:solidFill>
-                          <a:latin typeface="Arial"/>
-                          <a:cs typeface="Arial"/>
-                        </a:rPr>
-                        <a:t>Models</a:t>
-                      </a:r>
-                      <a:endParaRPr lang="en-US" sz="1600" b="0" dirty="0">
-                        <a:latin typeface="Arial"/>
-                        <a:cs typeface="Arial"/>
-                      </a:endParaRPr>
-                    </a:p>
-                  </a:txBody>
-                  <a:tcPr>
-                    <a:solidFill>
-                      <a:schemeClr val="bg1">
-                        <a:lumMod val="85000"/>
-                      </a:schemeClr>
-                    </a:solidFill>
-                  </a:tcPr>
-                </a:tc>
-                <a:tc>
-                  <a:txBody>
-                    <a:bodyPr/>
-                    <a:lstStyle/>
-                    <a:p>
-                      <a:pPr algn="ctr"/>
-                      <a:r>
-                        <a:rPr lang="en-US" sz="1600" b="0" dirty="0">
-                          <a:solidFill>
-                            <a:srgbClr val="0000FF"/>
+                            <a:schemeClr val="tx1"/>
                           </a:solidFill>
                           <a:latin typeface="Arial"/>
                           <a:cs typeface="Arial"/>
                         </a:rPr>
                         <a:t>Files</a:t>
                       </a:r>
-                      <a:endParaRPr lang="en-US" sz="1600" b="0" dirty="0">
-                        <a:latin typeface="Arial"/>
-                        <a:cs typeface="Arial"/>
-                      </a:endParaRPr>
                     </a:p>
                   </a:txBody>
                   <a:tcPr>
@@ -49869,7 +50111,7 @@
                       <a:r>
                         <a:rPr lang="en-US" sz="1600" b="0" dirty="0" err="1">
                           <a:solidFill>
-                            <a:srgbClr val="0000FF"/>
+                            <a:schemeClr val="tx1"/>
                           </a:solidFill>
                           <a:latin typeface="Arial"/>
                           <a:cs typeface="Arial"/>
@@ -49877,6 +50119,9 @@
                         <a:t>OutStreams</a:t>
                       </a:r>
                       <a:endParaRPr lang="en-US" sz="1600" b="0" dirty="0">
+                        <a:solidFill>
+                          <a:schemeClr val="tx1"/>
+                        </a:solidFill>
                         <a:latin typeface="Arial"/>
                         <a:cs typeface="Arial"/>
                       </a:endParaRPr>
@@ -49899,14 +50144,33 @@
                       <a:r>
                         <a:rPr lang="en-US" sz="1600" b="0" dirty="0">
                           <a:solidFill>
-                            <a:srgbClr val="0000FF"/>
+                            <a:schemeClr val="tx1"/>
                           </a:solidFill>
                           <a:latin typeface="Arial"/>
                           <a:cs typeface="Arial"/>
                         </a:rPr>
                         <a:t>Steps</a:t>
                       </a:r>
+                    </a:p>
+                  </a:txBody>
+                  <a:tcPr>
+                    <a:solidFill>
+                      <a:schemeClr val="bg1">
+                        <a:lumMod val="85000"/>
+                      </a:schemeClr>
+                    </a:solidFill>
+                  </a:tcPr>
+                </a:tc>
+                <a:tc>
+                  <a:txBody>
+                    <a:bodyPr/>
+                    <a:lstStyle/>
+                    <a:p>
+                      <a:pPr algn="ctr"/>
                       <a:endParaRPr lang="en-US" sz="1600" b="0" dirty="0">
+                        <a:solidFill>
+                          <a:schemeClr val="tx1"/>
+                        </a:solidFill>
                         <a:latin typeface="Arial"/>
                         <a:cs typeface="Arial"/>
                       </a:endParaRPr>
@@ -49927,6 +50191,9 @@
                     <a:p>
                       <a:pPr algn="ctr"/>
                       <a:endParaRPr lang="en-US" sz="1600" b="0" dirty="0">
+                        <a:solidFill>
+                          <a:schemeClr val="tx1"/>
+                        </a:solidFill>
                         <a:latin typeface="Arial"/>
                         <a:cs typeface="Arial"/>
                       </a:endParaRPr>
@@ -49947,6 +50214,9 @@
                     <a:p>
                       <a:pPr algn="ctr"/>
                       <a:endParaRPr lang="en-US" sz="1600" b="0" dirty="0">
+                        <a:solidFill>
+                          <a:schemeClr val="tx1"/>
+                        </a:solidFill>
                         <a:latin typeface="Arial"/>
                         <a:cs typeface="Arial"/>
                       </a:endParaRPr>
@@ -49967,26 +50237,9 @@
                     <a:p>
                       <a:pPr algn="ctr"/>
                       <a:endParaRPr lang="en-US" sz="1600" b="0" dirty="0">
-                        <a:latin typeface="Arial"/>
-                        <a:cs typeface="Arial"/>
-                      </a:endParaRPr>
-                    </a:p>
-                  </a:txBody>
-                  <a:tcPr>
-                    <a:solidFill>
-                      <a:schemeClr val="bg1">
-                        <a:lumMod val="85000"/>
-                      </a:schemeClr>
-                    </a:solidFill>
-                  </a:tcPr>
-                </a:tc>
-                <a:tc>
-                  <a:txBody>
-                    <a:bodyPr/>
-                    <a:lstStyle/>
-                    <a:p>
-                      <a:pPr algn="ctr"/>
-                      <a:endParaRPr lang="en-US" sz="1600" b="0" dirty="0">
+                        <a:solidFill>
+                          <a:schemeClr val="tx1"/>
+                        </a:solidFill>
                         <a:latin typeface="Arial"/>
                         <a:cs typeface="Arial"/>
                       </a:endParaRPr>
@@ -50697,7 +50950,7 @@
           <p:nvPr>
             <p:extLst>
               <p:ext uri="{D42A27DB-BD31-4B8C-83A1-F6EECF244321}">
-                <p14:modId xmlns:p14="http://schemas.microsoft.com/office/powerpoint/2010/main" val="315119229"/>
+                <p14:modId xmlns:p14="http://schemas.microsoft.com/office/powerpoint/2010/main" val="306059312"/>
               </p:ext>
             </p:extLst>
           </p:nvPr>
@@ -50766,7 +51019,7 @@
                       <a:r>
                         <a:rPr lang="en-US" sz="1600" b="0" dirty="0" err="1">
                           <a:solidFill>
-                            <a:srgbClr val="0000FF"/>
+                            <a:schemeClr val="tx1"/>
                           </a:solidFill>
                           <a:latin typeface="Arial"/>
                           <a:cs typeface="Arial"/>
@@ -50775,7 +51028,7 @@
                       </a:r>
                       <a:endParaRPr lang="en-US" sz="1600" b="0" dirty="0">
                         <a:solidFill>
-                          <a:srgbClr val="0000FF"/>
+                          <a:schemeClr val="tx1"/>
                         </a:solidFill>
                         <a:latin typeface="Arial"/>
                         <a:cs typeface="Arial"/>
@@ -50799,17 +51052,13 @@
                       <a:r>
                         <a:rPr lang="en-US" sz="1600" b="0" dirty="0">
                           <a:solidFill>
-                            <a:srgbClr val="0000FF"/>
+                            <a:schemeClr val="tx1"/>
                           </a:solidFill>
                           <a:latin typeface="Arial"/>
                           <a:cs typeface="Arial"/>
                         </a:rPr>
                         <a:t>Distributions</a:t>
                       </a:r>
-                      <a:endParaRPr lang="en-US" sz="1600" b="0" dirty="0">
-                        <a:latin typeface="Arial"/>
-                        <a:cs typeface="Arial"/>
-                      </a:endParaRPr>
                     </a:p>
                   </a:txBody>
                   <a:tcPr>
@@ -50829,17 +51078,13 @@
                       <a:r>
                         <a:rPr lang="en-US" sz="1600" b="0" dirty="0">
                           <a:solidFill>
-                            <a:srgbClr val="0000FF"/>
+                            <a:schemeClr val="tx1"/>
                           </a:solidFill>
                           <a:latin typeface="Arial"/>
                           <a:cs typeface="Arial"/>
                         </a:rPr>
                         <a:t>Samplers</a:t>
                       </a:r>
-                      <a:endParaRPr lang="en-US" sz="1600" b="0" dirty="0">
-                        <a:latin typeface="Arial"/>
-                        <a:cs typeface="Arial"/>
-                      </a:endParaRPr>
                     </a:p>
                   </a:txBody>
                   <a:tcPr>
@@ -50859,7 +51104,7 @@
                       <a:r>
                         <a:rPr lang="en-US" sz="1600" b="0" dirty="0" err="1">
                           <a:solidFill>
-                            <a:srgbClr val="0000FF"/>
+                            <a:schemeClr val="tx1"/>
                           </a:solidFill>
                           <a:latin typeface="Arial"/>
                           <a:cs typeface="Arial"/>
@@ -50867,6 +51112,9 @@
                         <a:t>DataObjects</a:t>
                       </a:r>
                       <a:endParaRPr lang="en-US" sz="1600" b="0" dirty="0">
+                        <a:solidFill>
+                          <a:schemeClr val="tx1"/>
+                        </a:solidFill>
                         <a:latin typeface="Arial"/>
                         <a:cs typeface="Arial"/>
                       </a:endParaRPr>
@@ -50889,17 +51137,13 @@
                       <a:r>
                         <a:rPr lang="en-US" sz="1600" b="0" dirty="0">
                           <a:solidFill>
-                            <a:srgbClr val="0000FF"/>
+                            <a:schemeClr val="tx1"/>
                           </a:solidFill>
                           <a:latin typeface="Arial"/>
                           <a:cs typeface="Arial"/>
                         </a:rPr>
                         <a:t>Models</a:t>
                       </a:r>
-                      <a:endParaRPr lang="en-US" sz="1600" b="0" dirty="0">
-                        <a:latin typeface="Arial"/>
-                        <a:cs typeface="Arial"/>
-                      </a:endParaRPr>
                     </a:p>
                   </a:txBody>
                   <a:tcPr>
@@ -50919,17 +51163,13 @@
                       <a:r>
                         <a:rPr lang="en-US" sz="1600" b="0" dirty="0">
                           <a:solidFill>
-                            <a:srgbClr val="0000FF"/>
+                            <a:schemeClr val="tx1"/>
                           </a:solidFill>
                           <a:latin typeface="Arial"/>
                           <a:cs typeface="Arial"/>
                         </a:rPr>
                         <a:t>Files</a:t>
                       </a:r>
-                      <a:endParaRPr lang="en-US" sz="1600" b="0" dirty="0">
-                        <a:latin typeface="Arial"/>
-                        <a:cs typeface="Arial"/>
-                      </a:endParaRPr>
                     </a:p>
                   </a:txBody>
                   <a:tcPr>
@@ -50956,7 +51196,7 @@
                       <a:r>
                         <a:rPr lang="en-US" sz="1600" b="0" dirty="0" err="1">
                           <a:solidFill>
-                            <a:srgbClr val="0000FF"/>
+                            <a:schemeClr val="tx1"/>
                           </a:solidFill>
                           <a:latin typeface="Arial"/>
                           <a:cs typeface="Arial"/>
@@ -50964,6 +51204,9 @@
                         <a:t>OutStreams</a:t>
                       </a:r>
                       <a:endParaRPr lang="en-US" sz="1600" b="0" dirty="0">
+                        <a:solidFill>
+                          <a:schemeClr val="tx1"/>
+                        </a:solidFill>
                         <a:latin typeface="Arial"/>
                         <a:cs typeface="Arial"/>
                       </a:endParaRPr>
@@ -50986,14 +51229,33 @@
                       <a:r>
                         <a:rPr lang="en-US" sz="1600" b="0" dirty="0">
                           <a:solidFill>
-                            <a:srgbClr val="0000FF"/>
+                            <a:schemeClr val="tx1"/>
                           </a:solidFill>
                           <a:latin typeface="Arial"/>
                           <a:cs typeface="Arial"/>
                         </a:rPr>
                         <a:t>Steps</a:t>
                       </a:r>
+                    </a:p>
+                  </a:txBody>
+                  <a:tcPr>
+                    <a:solidFill>
+                      <a:schemeClr val="bg1">
+                        <a:lumMod val="85000"/>
+                      </a:schemeClr>
+                    </a:solidFill>
+                  </a:tcPr>
+                </a:tc>
+                <a:tc>
+                  <a:txBody>
+                    <a:bodyPr/>
+                    <a:lstStyle/>
+                    <a:p>
+                      <a:pPr algn="ctr"/>
                       <a:endParaRPr lang="en-US" sz="1600" b="0" dirty="0">
+                        <a:solidFill>
+                          <a:schemeClr val="tx1"/>
+                        </a:solidFill>
                         <a:latin typeface="Arial"/>
                         <a:cs typeface="Arial"/>
                       </a:endParaRPr>
@@ -51014,6 +51276,9 @@
                     <a:p>
                       <a:pPr algn="ctr"/>
                       <a:endParaRPr lang="en-US" sz="1600" b="0" dirty="0">
+                        <a:solidFill>
+                          <a:schemeClr val="tx1"/>
+                        </a:solidFill>
                         <a:latin typeface="Arial"/>
                         <a:cs typeface="Arial"/>
                       </a:endParaRPr>
@@ -51034,6 +51299,9 @@
                     <a:p>
                       <a:pPr algn="ctr"/>
                       <a:endParaRPr lang="en-US" sz="1600" b="0" dirty="0">
+                        <a:solidFill>
+                          <a:schemeClr val="tx1"/>
+                        </a:solidFill>
                         <a:latin typeface="Arial"/>
                         <a:cs typeface="Arial"/>
                       </a:endParaRPr>
@@ -51054,26 +51322,9 @@
                     <a:p>
                       <a:pPr algn="ctr"/>
                       <a:endParaRPr lang="en-US" sz="1600" b="0" dirty="0">
-                        <a:latin typeface="Arial"/>
-                        <a:cs typeface="Arial"/>
-                      </a:endParaRPr>
-                    </a:p>
-                  </a:txBody>
-                  <a:tcPr>
-                    <a:solidFill>
-                      <a:schemeClr val="bg1">
-                        <a:lumMod val="85000"/>
-                      </a:schemeClr>
-                    </a:solidFill>
-                  </a:tcPr>
-                </a:tc>
-                <a:tc>
-                  <a:txBody>
-                    <a:bodyPr/>
-                    <a:lstStyle/>
-                    <a:p>
-                      <a:pPr algn="ctr"/>
-                      <a:endParaRPr lang="en-US" sz="1600" b="0" dirty="0">
+                        <a:solidFill>
+                          <a:schemeClr val="tx1"/>
+                        </a:solidFill>
                         <a:latin typeface="Arial"/>
                         <a:cs typeface="Arial"/>
                       </a:endParaRPr>
@@ -51705,7 +51956,7 @@
           <p:nvPr>
             <p:extLst>
               <p:ext uri="{D42A27DB-BD31-4B8C-83A1-F6EECF244321}">
-                <p14:modId xmlns:p14="http://schemas.microsoft.com/office/powerpoint/2010/main" val="609027741"/>
+                <p14:modId xmlns:p14="http://schemas.microsoft.com/office/powerpoint/2010/main" val="4088202378"/>
               </p:ext>
             </p:extLst>
           </p:nvPr>
@@ -51774,7 +52025,7 @@
                       <a:r>
                         <a:rPr lang="en-US" sz="1600" b="0" dirty="0" err="1">
                           <a:solidFill>
-                            <a:srgbClr val="0000FF"/>
+                            <a:schemeClr val="tx1"/>
                           </a:solidFill>
                           <a:latin typeface="Arial"/>
                           <a:cs typeface="Arial"/>
@@ -51783,7 +52034,7 @@
                       </a:r>
                       <a:endParaRPr lang="en-US" sz="1600" b="0" dirty="0">
                         <a:solidFill>
-                          <a:srgbClr val="0000FF"/>
+                          <a:schemeClr val="tx1"/>
                         </a:solidFill>
                         <a:latin typeface="Arial"/>
                         <a:cs typeface="Arial"/>
@@ -51807,14 +52058,69 @@
                       <a:r>
                         <a:rPr lang="en-US" sz="1600" b="0" dirty="0">
                           <a:solidFill>
-                            <a:srgbClr val="0000FF"/>
+                            <a:schemeClr val="tx1"/>
                           </a:solidFill>
                           <a:latin typeface="Arial"/>
                           <a:cs typeface="Arial"/>
                         </a:rPr>
                         <a:t>Distributions</a:t>
                       </a:r>
+                    </a:p>
+                  </a:txBody>
+                  <a:tcPr>
+                    <a:solidFill>
+                      <a:schemeClr val="bg1">
+                        <a:lumMod val="85000"/>
+                      </a:schemeClr>
+                    </a:solidFill>
+                  </a:tcPr>
+                </a:tc>
+                <a:tc>
+                  <a:txBody>
+                    <a:bodyPr/>
+                    <a:lstStyle/>
+                    <a:p>
+                      <a:pPr algn="ctr"/>
+                      <a:r>
+                        <a:rPr lang="en-US" sz="1600" b="0" dirty="0">
+                          <a:solidFill>
+                            <a:schemeClr val="tx1"/>
+                          </a:solidFill>
+                          <a:latin typeface="Arial"/>
+                          <a:cs typeface="Arial"/>
+                        </a:rPr>
+                        <a:t>Samplers</a:t>
+                      </a:r>
+                    </a:p>
+                  </a:txBody>
+                  <a:tcPr>
+                    <a:solidFill>
+                      <a:schemeClr val="bg1">
+                        <a:lumMod val="65000"/>
+                      </a:schemeClr>
+                    </a:solidFill>
+                  </a:tcPr>
+                </a:tc>
+                <a:tc>
+                  <a:txBody>
+                    <a:bodyPr/>
+                    <a:lstStyle/>
+                    <a:p>
+                      <a:pPr algn="ctr"/>
+                      <a:r>
+                        <a:rPr lang="en-US" sz="1600" b="0" dirty="0" err="1">
+                          <a:solidFill>
+                            <a:schemeClr val="tx1"/>
+                          </a:solidFill>
+                          <a:latin typeface="Arial"/>
+                          <a:cs typeface="Arial"/>
+                        </a:rPr>
+                        <a:t>DataObjects</a:t>
+                      </a:r>
                       <a:endParaRPr lang="en-US" sz="1600" b="0" dirty="0">
+                        <a:solidFill>
+                          <a:schemeClr val="tx1"/>
+                        </a:solidFill>
                         <a:latin typeface="Arial"/>
                         <a:cs typeface="Arial"/>
                       </a:endParaRPr>
@@ -51837,47 +52143,13 @@
                       <a:r>
                         <a:rPr lang="en-US" sz="1600" b="0" dirty="0">
                           <a:solidFill>
-                            <a:srgbClr val="0000FF"/>
+                            <a:schemeClr val="tx1"/>
                           </a:solidFill>
                           <a:latin typeface="Arial"/>
                           <a:cs typeface="Arial"/>
                         </a:rPr>
-                        <a:t>Samplers</a:t>
+                        <a:t>Models</a:t>
                       </a:r>
-                      <a:endParaRPr lang="en-US" sz="1600" b="0" dirty="0">
-                        <a:latin typeface="Arial"/>
-                        <a:cs typeface="Arial"/>
-                      </a:endParaRPr>
-                    </a:p>
-                  </a:txBody>
-                  <a:tcPr>
-                    <a:solidFill>
-                      <a:schemeClr val="bg1">
-                        <a:lumMod val="65000"/>
-                      </a:schemeClr>
-                    </a:solidFill>
-                  </a:tcPr>
-                </a:tc>
-                <a:tc>
-                  <a:txBody>
-                    <a:bodyPr/>
-                    <a:lstStyle/>
-                    <a:p>
-                      <a:pPr algn="ctr"/>
-                      <a:r>
-                        <a:rPr lang="en-US" sz="1600" b="0" dirty="0" err="1">
-                          <a:solidFill>
-                            <a:srgbClr val="0000FF"/>
-                          </a:solidFill>
-                          <a:latin typeface="Arial"/>
-                          <a:cs typeface="Arial"/>
-                        </a:rPr>
-                        <a:t>DataObjects</a:t>
-                      </a:r>
-                      <a:endParaRPr lang="en-US" sz="1600" b="0" dirty="0">
-                        <a:latin typeface="Arial"/>
-                        <a:cs typeface="Arial"/>
-                      </a:endParaRPr>
                     </a:p>
                   </a:txBody>
                   <a:tcPr>
@@ -51897,47 +52169,13 @@
                       <a:r>
                         <a:rPr lang="en-US" sz="1600" b="0" dirty="0">
                           <a:solidFill>
-                            <a:srgbClr val="0000FF"/>
-                          </a:solidFill>
-                          <a:latin typeface="Arial"/>
-                          <a:cs typeface="Arial"/>
-                        </a:rPr>
-                        <a:t>Models</a:t>
-                      </a:r>
-                      <a:endParaRPr lang="en-US" sz="1600" b="0" dirty="0">
-                        <a:latin typeface="Arial"/>
-                        <a:cs typeface="Arial"/>
-                      </a:endParaRPr>
-                    </a:p>
-                  </a:txBody>
-                  <a:tcPr>
-                    <a:solidFill>
-                      <a:schemeClr val="bg1">
-                        <a:lumMod val="85000"/>
-                      </a:schemeClr>
-                    </a:solidFill>
-                  </a:tcPr>
-                </a:tc>
-                <a:tc>
-                  <a:txBody>
-                    <a:bodyPr/>
-                    <a:lstStyle/>
-                    <a:p>
-                      <a:pPr algn="ctr"/>
-                      <a:r>
-                        <a:rPr lang="en-US" sz="1600" b="0" dirty="0">
-                          <a:solidFill>
-                            <a:srgbClr val="0000FF"/>
+                            <a:schemeClr val="tx1"/>
                           </a:solidFill>
                           <a:latin typeface="Arial"/>
                           <a:cs typeface="Arial"/>
                         </a:rPr>
                         <a:t>Files</a:t>
                       </a:r>
-                      <a:endParaRPr lang="en-US" sz="1600" b="0" dirty="0">
-                        <a:latin typeface="Arial"/>
-                        <a:cs typeface="Arial"/>
-                      </a:endParaRPr>
                     </a:p>
                   </a:txBody>
                   <a:tcPr>
@@ -51964,7 +52202,7 @@
                       <a:r>
                         <a:rPr lang="en-US" sz="1600" b="0" dirty="0" err="1">
                           <a:solidFill>
-                            <a:srgbClr val="0000FF"/>
+                            <a:schemeClr val="tx1"/>
                           </a:solidFill>
                           <a:latin typeface="Arial"/>
                           <a:cs typeface="Arial"/>
@@ -51972,6 +52210,9 @@
                         <a:t>OutStreams</a:t>
                       </a:r>
                       <a:endParaRPr lang="en-US" sz="1600" b="0" dirty="0">
+                        <a:solidFill>
+                          <a:schemeClr val="tx1"/>
+                        </a:solidFill>
                         <a:latin typeface="Arial"/>
                         <a:cs typeface="Arial"/>
                       </a:endParaRPr>
@@ -51994,14 +52235,33 @@
                       <a:r>
                         <a:rPr lang="en-US" sz="1600" b="0" dirty="0">
                           <a:solidFill>
-                            <a:srgbClr val="0000FF"/>
+                            <a:schemeClr val="tx1"/>
                           </a:solidFill>
                           <a:latin typeface="Arial"/>
                           <a:cs typeface="Arial"/>
                         </a:rPr>
                         <a:t>Steps</a:t>
                       </a:r>
+                    </a:p>
+                  </a:txBody>
+                  <a:tcPr>
+                    <a:solidFill>
+                      <a:schemeClr val="bg1">
+                        <a:lumMod val="85000"/>
+                      </a:schemeClr>
+                    </a:solidFill>
+                  </a:tcPr>
+                </a:tc>
+                <a:tc>
+                  <a:txBody>
+                    <a:bodyPr/>
+                    <a:lstStyle/>
+                    <a:p>
+                      <a:pPr algn="ctr"/>
                       <a:endParaRPr lang="en-US" sz="1600" b="0" dirty="0">
+                        <a:solidFill>
+                          <a:schemeClr val="tx1"/>
+                        </a:solidFill>
                         <a:latin typeface="Arial"/>
                         <a:cs typeface="Arial"/>
                       </a:endParaRPr>
@@ -52022,6 +52282,9 @@
                     <a:p>
                       <a:pPr algn="ctr"/>
                       <a:endParaRPr lang="en-US" sz="1600" b="0" dirty="0">
+                        <a:solidFill>
+                          <a:schemeClr val="tx1"/>
+                        </a:solidFill>
                         <a:latin typeface="Arial"/>
                         <a:cs typeface="Arial"/>
                       </a:endParaRPr>
@@ -52042,6 +52305,9 @@
                     <a:p>
                       <a:pPr algn="ctr"/>
                       <a:endParaRPr lang="en-US" sz="1600" b="0" dirty="0">
+                        <a:solidFill>
+                          <a:schemeClr val="tx1"/>
+                        </a:solidFill>
                         <a:latin typeface="Arial"/>
                         <a:cs typeface="Arial"/>
                       </a:endParaRPr>
@@ -52062,26 +52328,9 @@
                     <a:p>
                       <a:pPr algn="ctr"/>
                       <a:endParaRPr lang="en-US" sz="1600" b="0" dirty="0">
-                        <a:latin typeface="Arial"/>
-                        <a:cs typeface="Arial"/>
-                      </a:endParaRPr>
-                    </a:p>
-                  </a:txBody>
-                  <a:tcPr>
-                    <a:solidFill>
-                      <a:schemeClr val="bg1">
-                        <a:lumMod val="85000"/>
-                      </a:schemeClr>
-                    </a:solidFill>
-                  </a:tcPr>
-                </a:tc>
-                <a:tc>
-                  <a:txBody>
-                    <a:bodyPr/>
-                    <a:lstStyle/>
-                    <a:p>
-                      <a:pPr algn="ctr"/>
-                      <a:endParaRPr lang="en-US" sz="1600" b="0" dirty="0">
+                        <a:solidFill>
+                          <a:schemeClr val="tx1"/>
+                        </a:solidFill>
                         <a:latin typeface="Arial"/>
                         <a:cs typeface="Arial"/>
                       </a:endParaRPr>
@@ -52638,7 +52887,7 @@
           <p:nvPr>
             <p:extLst>
               <p:ext uri="{D42A27DB-BD31-4B8C-83A1-F6EECF244321}">
-                <p14:modId xmlns:p14="http://schemas.microsoft.com/office/powerpoint/2010/main" val="1164278224"/>
+                <p14:modId xmlns:p14="http://schemas.microsoft.com/office/powerpoint/2010/main" val="462459651"/>
               </p:ext>
             </p:extLst>
           </p:nvPr>
@@ -52707,7 +52956,7 @@
                       <a:r>
                         <a:rPr lang="en-US" sz="1600" b="0" dirty="0" err="1">
                           <a:solidFill>
-                            <a:srgbClr val="0000FF"/>
+                            <a:schemeClr val="tx1"/>
                           </a:solidFill>
                           <a:latin typeface="Arial"/>
                           <a:cs typeface="Arial"/>
@@ -52716,7 +52965,7 @@
                       </a:r>
                       <a:endParaRPr lang="en-US" sz="1600" b="0" dirty="0">
                         <a:solidFill>
-                          <a:srgbClr val="0000FF"/>
+                          <a:schemeClr val="tx1"/>
                         </a:solidFill>
                         <a:latin typeface="Arial"/>
                         <a:cs typeface="Arial"/>
@@ -52740,17 +52989,13 @@
                       <a:r>
                         <a:rPr lang="en-US" sz="1600" b="0" dirty="0">
                           <a:solidFill>
-                            <a:srgbClr val="0000FF"/>
+                            <a:schemeClr val="tx1"/>
                           </a:solidFill>
                           <a:latin typeface="Arial"/>
                           <a:cs typeface="Arial"/>
                         </a:rPr>
                         <a:t>Distributions</a:t>
                       </a:r>
-                      <a:endParaRPr lang="en-US" sz="1600" b="0" dirty="0">
-                        <a:latin typeface="Arial"/>
-                        <a:cs typeface="Arial"/>
-                      </a:endParaRPr>
                     </a:p>
                   </a:txBody>
                   <a:tcPr>
@@ -52770,17 +53015,13 @@
                       <a:r>
                         <a:rPr lang="en-US" sz="1600" b="0" dirty="0">
                           <a:solidFill>
-                            <a:srgbClr val="0000FF"/>
+                            <a:schemeClr val="tx1"/>
                           </a:solidFill>
                           <a:latin typeface="Arial"/>
                           <a:cs typeface="Arial"/>
                         </a:rPr>
                         <a:t>Samplers</a:t>
                       </a:r>
-                      <a:endParaRPr lang="en-US" sz="1600" b="0" dirty="0">
-                        <a:latin typeface="Arial"/>
-                        <a:cs typeface="Arial"/>
-                      </a:endParaRPr>
                     </a:p>
                   </a:txBody>
                   <a:tcPr>
@@ -52800,7 +53041,7 @@
                       <a:r>
                         <a:rPr lang="en-US" sz="1600" b="0" dirty="0" err="1">
                           <a:solidFill>
-                            <a:srgbClr val="0000FF"/>
+                            <a:schemeClr val="tx1"/>
                           </a:solidFill>
                           <a:latin typeface="Arial"/>
                           <a:cs typeface="Arial"/>
@@ -52808,6 +53049,9 @@
                         <a:t>DataObjects</a:t>
                       </a:r>
                       <a:endParaRPr lang="en-US" sz="1600" b="0" dirty="0">
+                        <a:solidFill>
+                          <a:schemeClr val="tx1"/>
+                        </a:solidFill>
                         <a:latin typeface="Arial"/>
                         <a:cs typeface="Arial"/>
                       </a:endParaRPr>
@@ -52830,17 +53074,13 @@
                       <a:r>
                         <a:rPr lang="en-US" sz="1600" b="0" dirty="0">
                           <a:solidFill>
-                            <a:srgbClr val="0000FF"/>
+                            <a:schemeClr val="tx1"/>
                           </a:solidFill>
                           <a:latin typeface="Arial"/>
                           <a:cs typeface="Arial"/>
                         </a:rPr>
                         <a:t>Models</a:t>
                       </a:r>
-                      <a:endParaRPr lang="en-US" sz="1600" b="0" dirty="0">
-                        <a:latin typeface="Arial"/>
-                        <a:cs typeface="Arial"/>
-                      </a:endParaRPr>
                     </a:p>
                   </a:txBody>
                   <a:tcPr>
@@ -52860,17 +53100,13 @@
                       <a:r>
                         <a:rPr lang="en-US" sz="1600" b="0" dirty="0">
                           <a:solidFill>
-                            <a:srgbClr val="0000FF"/>
+                            <a:schemeClr val="tx1"/>
                           </a:solidFill>
                           <a:latin typeface="Arial"/>
                           <a:cs typeface="Arial"/>
                         </a:rPr>
                         <a:t>Files</a:t>
                       </a:r>
-                      <a:endParaRPr lang="en-US" sz="1600" b="0" dirty="0">
-                        <a:latin typeface="Arial"/>
-                        <a:cs typeface="Arial"/>
-                      </a:endParaRPr>
                     </a:p>
                   </a:txBody>
                   <a:tcPr>
@@ -52897,7 +53133,7 @@
                       <a:r>
                         <a:rPr lang="en-US" sz="1600" b="0" dirty="0" err="1">
                           <a:solidFill>
-                            <a:srgbClr val="0000FF"/>
+                            <a:schemeClr val="tx1"/>
                           </a:solidFill>
                           <a:latin typeface="Arial"/>
                           <a:cs typeface="Arial"/>
@@ -52905,6 +53141,9 @@
                         <a:t>OutStreams</a:t>
                       </a:r>
                       <a:endParaRPr lang="en-US" sz="1600" b="0" dirty="0">
+                        <a:solidFill>
+                          <a:schemeClr val="tx1"/>
+                        </a:solidFill>
                         <a:latin typeface="Arial"/>
                         <a:cs typeface="Arial"/>
                       </a:endParaRPr>
@@ -52927,14 +53166,33 @@
                       <a:r>
                         <a:rPr lang="en-US" sz="1600" b="0" dirty="0">
                           <a:solidFill>
-                            <a:srgbClr val="0000FF"/>
+                            <a:schemeClr val="tx1"/>
                           </a:solidFill>
                           <a:latin typeface="Arial"/>
                           <a:cs typeface="Arial"/>
                         </a:rPr>
                         <a:t>Steps</a:t>
                       </a:r>
+                    </a:p>
+                  </a:txBody>
+                  <a:tcPr>
+                    <a:solidFill>
+                      <a:schemeClr val="bg1">
+                        <a:lumMod val="85000"/>
+                      </a:schemeClr>
+                    </a:solidFill>
+                  </a:tcPr>
+                </a:tc>
+                <a:tc>
+                  <a:txBody>
+                    <a:bodyPr/>
+                    <a:lstStyle/>
+                    <a:p>
+                      <a:pPr algn="ctr"/>
                       <a:endParaRPr lang="en-US" sz="1600" b="0" dirty="0">
+                        <a:solidFill>
+                          <a:schemeClr val="tx1"/>
+                        </a:solidFill>
                         <a:latin typeface="Arial"/>
                         <a:cs typeface="Arial"/>
                       </a:endParaRPr>
@@ -52955,6 +53213,9 @@
                     <a:p>
                       <a:pPr algn="ctr"/>
                       <a:endParaRPr lang="en-US" sz="1600" b="0" dirty="0">
+                        <a:solidFill>
+                          <a:schemeClr val="tx1"/>
+                        </a:solidFill>
                         <a:latin typeface="Arial"/>
                         <a:cs typeface="Arial"/>
                       </a:endParaRPr>
@@ -52975,6 +53236,9 @@
                     <a:p>
                       <a:pPr algn="ctr"/>
                       <a:endParaRPr lang="en-US" sz="1600" b="0" dirty="0">
+                        <a:solidFill>
+                          <a:schemeClr val="tx1"/>
+                        </a:solidFill>
                         <a:latin typeface="Arial"/>
                         <a:cs typeface="Arial"/>
                       </a:endParaRPr>
@@ -52995,26 +53259,9 @@
                     <a:p>
                       <a:pPr algn="ctr"/>
                       <a:endParaRPr lang="en-US" sz="1600" b="0" dirty="0">
-                        <a:latin typeface="Arial"/>
-                        <a:cs typeface="Arial"/>
-                      </a:endParaRPr>
-                    </a:p>
-                  </a:txBody>
-                  <a:tcPr>
-                    <a:solidFill>
-                      <a:schemeClr val="bg1">
-                        <a:lumMod val="85000"/>
-                      </a:schemeClr>
-                    </a:solidFill>
-                  </a:tcPr>
-                </a:tc>
-                <a:tc>
-                  <a:txBody>
-                    <a:bodyPr/>
-                    <a:lstStyle/>
-                    <a:p>
-                      <a:pPr algn="ctr"/>
-                      <a:endParaRPr lang="en-US" sz="1600" b="0" dirty="0">
+                        <a:solidFill>
+                          <a:schemeClr val="tx1"/>
+                        </a:solidFill>
                         <a:latin typeface="Arial"/>
                         <a:cs typeface="Arial"/>
                       </a:endParaRPr>
@@ -53653,7 +53900,7 @@
           <p:nvPr>
             <p:extLst>
               <p:ext uri="{D42A27DB-BD31-4B8C-83A1-F6EECF244321}">
-                <p14:modId xmlns:p14="http://schemas.microsoft.com/office/powerpoint/2010/main" val="3222333225"/>
+                <p14:modId xmlns:p14="http://schemas.microsoft.com/office/powerpoint/2010/main" val="238278182"/>
               </p:ext>
             </p:extLst>
           </p:nvPr>
@@ -53722,7 +53969,7 @@
                       <a:r>
                         <a:rPr lang="en-US" sz="1600" b="0" dirty="0" err="1">
                           <a:solidFill>
-                            <a:srgbClr val="0000FF"/>
+                            <a:schemeClr val="tx1"/>
                           </a:solidFill>
                           <a:latin typeface="Arial"/>
                           <a:cs typeface="Arial"/>
@@ -53731,7 +53978,7 @@
                       </a:r>
                       <a:endParaRPr lang="en-US" sz="1600" b="0" dirty="0">
                         <a:solidFill>
-                          <a:srgbClr val="0000FF"/>
+                          <a:schemeClr val="tx1"/>
                         </a:solidFill>
                         <a:latin typeface="Arial"/>
                         <a:cs typeface="Arial"/>
@@ -53755,14 +54002,69 @@
                       <a:r>
                         <a:rPr lang="en-US" sz="1600" b="0" dirty="0">
                           <a:solidFill>
-                            <a:srgbClr val="0000FF"/>
+                            <a:schemeClr val="tx1"/>
                           </a:solidFill>
                           <a:latin typeface="Arial"/>
                           <a:cs typeface="Arial"/>
                         </a:rPr>
                         <a:t>Distributions</a:t>
                       </a:r>
+                    </a:p>
+                  </a:txBody>
+                  <a:tcPr>
+                    <a:solidFill>
+                      <a:schemeClr val="bg1">
+                        <a:lumMod val="85000"/>
+                      </a:schemeClr>
+                    </a:solidFill>
+                  </a:tcPr>
+                </a:tc>
+                <a:tc>
+                  <a:txBody>
+                    <a:bodyPr/>
+                    <a:lstStyle/>
+                    <a:p>
+                      <a:pPr algn="ctr"/>
+                      <a:r>
+                        <a:rPr lang="en-US" sz="1600" b="0" dirty="0">
+                          <a:solidFill>
+                            <a:schemeClr val="tx1"/>
+                          </a:solidFill>
+                          <a:latin typeface="Arial"/>
+                          <a:cs typeface="Arial"/>
+                        </a:rPr>
+                        <a:t>Samplers</a:t>
+                      </a:r>
+                    </a:p>
+                  </a:txBody>
+                  <a:tcPr>
+                    <a:solidFill>
+                      <a:schemeClr val="bg1">
+                        <a:lumMod val="85000"/>
+                      </a:schemeClr>
+                    </a:solidFill>
+                  </a:tcPr>
+                </a:tc>
+                <a:tc>
+                  <a:txBody>
+                    <a:bodyPr/>
+                    <a:lstStyle/>
+                    <a:p>
+                      <a:pPr algn="ctr"/>
+                      <a:r>
+                        <a:rPr lang="en-US" sz="1600" b="0" dirty="0" err="1">
+                          <a:solidFill>
+                            <a:schemeClr val="tx1"/>
+                          </a:solidFill>
+                          <a:latin typeface="Arial"/>
+                          <a:cs typeface="Arial"/>
+                        </a:rPr>
+                        <a:t>DataObjects</a:t>
+                      </a:r>
                       <a:endParaRPr lang="en-US" sz="1600" b="0" dirty="0">
+                        <a:solidFill>
+                          <a:schemeClr val="tx1"/>
+                        </a:solidFill>
                         <a:latin typeface="Arial"/>
                         <a:cs typeface="Arial"/>
                       </a:endParaRPr>
@@ -53785,77 +54087,13 @@
                       <a:r>
                         <a:rPr lang="en-US" sz="1600" b="0" dirty="0">
                           <a:solidFill>
-                            <a:srgbClr val="0000FF"/>
-                          </a:solidFill>
-                          <a:latin typeface="Arial"/>
-                          <a:cs typeface="Arial"/>
-                        </a:rPr>
-                        <a:t>Samplers</a:t>
-                      </a:r>
-                      <a:endParaRPr lang="en-US" sz="1600" b="0" dirty="0">
-                        <a:latin typeface="Arial"/>
-                        <a:cs typeface="Arial"/>
-                      </a:endParaRPr>
-                    </a:p>
-                  </a:txBody>
-                  <a:tcPr>
-                    <a:solidFill>
-                      <a:schemeClr val="bg1">
-                        <a:lumMod val="85000"/>
-                      </a:schemeClr>
-                    </a:solidFill>
-                  </a:tcPr>
-                </a:tc>
-                <a:tc>
-                  <a:txBody>
-                    <a:bodyPr/>
-                    <a:lstStyle/>
-                    <a:p>
-                      <a:pPr algn="ctr"/>
-                      <a:r>
-                        <a:rPr lang="en-US" sz="1600" b="0" dirty="0" err="1">
-                          <a:solidFill>
-                            <a:srgbClr val="0000FF"/>
-                          </a:solidFill>
-                          <a:latin typeface="Arial"/>
-                          <a:cs typeface="Arial"/>
-                        </a:rPr>
-                        <a:t>DataObjects</a:t>
-                      </a:r>
-                      <a:endParaRPr lang="en-US" sz="1600" b="0" dirty="0">
-                        <a:latin typeface="Arial"/>
-                        <a:cs typeface="Arial"/>
-                      </a:endParaRPr>
-                    </a:p>
-                  </a:txBody>
-                  <a:tcPr>
-                    <a:solidFill>
-                      <a:schemeClr val="bg1">
-                        <a:lumMod val="85000"/>
-                      </a:schemeClr>
-                    </a:solidFill>
-                  </a:tcPr>
-                </a:tc>
-                <a:tc>
-                  <a:txBody>
-                    <a:bodyPr/>
-                    <a:lstStyle/>
-                    <a:p>
-                      <a:pPr algn="ctr"/>
-                      <a:r>
-                        <a:rPr lang="en-US" sz="1600" b="0" dirty="0">
-                          <a:solidFill>
-                            <a:srgbClr val="0000FF"/>
+                            <a:schemeClr val="tx1"/>
                           </a:solidFill>
                           <a:latin typeface="Arial"/>
                           <a:cs typeface="Arial"/>
                         </a:rPr>
                         <a:t>Models</a:t>
                       </a:r>
-                      <a:endParaRPr lang="en-US" sz="1600" b="0" dirty="0">
-                        <a:latin typeface="Arial"/>
-                        <a:cs typeface="Arial"/>
-                      </a:endParaRPr>
                     </a:p>
                   </a:txBody>
                   <a:tcPr>
@@ -53875,17 +54113,13 @@
                       <a:r>
                         <a:rPr lang="en-US" sz="1600" b="0" dirty="0">
                           <a:solidFill>
-                            <a:srgbClr val="0000FF"/>
+                            <a:schemeClr val="tx1"/>
                           </a:solidFill>
                           <a:latin typeface="Arial"/>
                           <a:cs typeface="Arial"/>
                         </a:rPr>
                         <a:t>Files</a:t>
                       </a:r>
-                      <a:endParaRPr lang="en-US" sz="1600" b="0" dirty="0">
-                        <a:latin typeface="Arial"/>
-                        <a:cs typeface="Arial"/>
-                      </a:endParaRPr>
                     </a:p>
                   </a:txBody>
                   <a:tcPr>
@@ -53912,7 +54146,7 @@
                       <a:r>
                         <a:rPr lang="en-US" sz="1600" b="0" dirty="0" err="1">
                           <a:solidFill>
-                            <a:srgbClr val="0000FF"/>
+                            <a:schemeClr val="tx1"/>
                           </a:solidFill>
                           <a:latin typeface="Arial"/>
                           <a:cs typeface="Arial"/>
@@ -53920,6 +54154,9 @@
                         <a:t>OutStreams</a:t>
                       </a:r>
                       <a:endParaRPr lang="en-US" sz="1600" b="0" dirty="0">
+                        <a:solidFill>
+                          <a:schemeClr val="tx1"/>
+                        </a:solidFill>
                         <a:latin typeface="Arial"/>
                         <a:cs typeface="Arial"/>
                       </a:endParaRPr>
@@ -53942,14 +54179,33 @@
                       <a:r>
                         <a:rPr lang="en-US" sz="1600" b="0" dirty="0">
                           <a:solidFill>
-                            <a:srgbClr val="0000FF"/>
+                            <a:schemeClr val="tx1"/>
                           </a:solidFill>
                           <a:latin typeface="Arial"/>
                           <a:cs typeface="Arial"/>
                         </a:rPr>
                         <a:t>Steps</a:t>
                       </a:r>
+                    </a:p>
+                  </a:txBody>
+                  <a:tcPr>
+                    <a:solidFill>
+                      <a:schemeClr val="bg1">
+                        <a:lumMod val="85000"/>
+                      </a:schemeClr>
+                    </a:solidFill>
+                  </a:tcPr>
+                </a:tc>
+                <a:tc>
+                  <a:txBody>
+                    <a:bodyPr/>
+                    <a:lstStyle/>
+                    <a:p>
+                      <a:pPr algn="ctr"/>
                       <a:endParaRPr lang="en-US" sz="1600" b="0" dirty="0">
+                        <a:solidFill>
+                          <a:schemeClr val="tx1"/>
+                        </a:solidFill>
                         <a:latin typeface="Arial"/>
                         <a:cs typeface="Arial"/>
                       </a:endParaRPr>
@@ -53970,6 +54226,9 @@
                     <a:p>
                       <a:pPr algn="ctr"/>
                       <a:endParaRPr lang="en-US" sz="1600" b="0" dirty="0">
+                        <a:solidFill>
+                          <a:schemeClr val="tx1"/>
+                        </a:solidFill>
                         <a:latin typeface="Arial"/>
                         <a:cs typeface="Arial"/>
                       </a:endParaRPr>
@@ -53990,6 +54249,9 @@
                     <a:p>
                       <a:pPr algn="ctr"/>
                       <a:endParaRPr lang="en-US" sz="1600" b="0" dirty="0">
+                        <a:solidFill>
+                          <a:schemeClr val="tx1"/>
+                        </a:solidFill>
                         <a:latin typeface="Arial"/>
                         <a:cs typeface="Arial"/>
                       </a:endParaRPr>
@@ -54010,26 +54272,9 @@
                     <a:p>
                       <a:pPr algn="ctr"/>
                       <a:endParaRPr lang="en-US" sz="1600" b="0" dirty="0">
-                        <a:latin typeface="Arial"/>
-                        <a:cs typeface="Arial"/>
-                      </a:endParaRPr>
-                    </a:p>
-                  </a:txBody>
-                  <a:tcPr>
-                    <a:solidFill>
-                      <a:schemeClr val="bg1">
-                        <a:lumMod val="85000"/>
-                      </a:schemeClr>
-                    </a:solidFill>
-                  </a:tcPr>
-                </a:tc>
-                <a:tc>
-                  <a:txBody>
-                    <a:bodyPr/>
-                    <a:lstStyle/>
-                    <a:p>
-                      <a:pPr algn="ctr"/>
-                      <a:endParaRPr lang="en-US" sz="1600" b="0" dirty="0">
+                        <a:solidFill>
+                          <a:schemeClr val="tx1"/>
+                        </a:solidFill>
                         <a:latin typeface="Arial"/>
                         <a:cs typeface="Arial"/>
                       </a:endParaRPr>
@@ -55139,7 +55384,7 @@
           <p:nvPr>
             <p:extLst>
               <p:ext uri="{D42A27DB-BD31-4B8C-83A1-F6EECF244321}">
-                <p14:modId xmlns:p14="http://schemas.microsoft.com/office/powerpoint/2010/main" val="3982427651"/>
+                <p14:modId xmlns:p14="http://schemas.microsoft.com/office/powerpoint/2010/main" val="1643079489"/>
               </p:ext>
             </p:extLst>
           </p:nvPr>
@@ -55208,7 +55453,7 @@
                       <a:r>
                         <a:rPr lang="en-US" sz="1600" b="0" dirty="0" err="1">
                           <a:solidFill>
-                            <a:srgbClr val="0000FF"/>
+                            <a:schemeClr val="tx1"/>
                           </a:solidFill>
                           <a:latin typeface="Arial"/>
                           <a:cs typeface="Arial"/>
@@ -55217,7 +55462,7 @@
                       </a:r>
                       <a:endParaRPr lang="en-US" sz="1600" b="0" dirty="0">
                         <a:solidFill>
-                          <a:srgbClr val="0000FF"/>
+                          <a:schemeClr val="tx1"/>
                         </a:solidFill>
                         <a:latin typeface="Arial"/>
                         <a:cs typeface="Arial"/>
@@ -55241,14 +55486,69 @@
                       <a:r>
                         <a:rPr lang="en-US" sz="1600" b="0" dirty="0">
                           <a:solidFill>
-                            <a:srgbClr val="0000FF"/>
+                            <a:schemeClr val="tx1"/>
                           </a:solidFill>
                           <a:latin typeface="Arial"/>
                           <a:cs typeface="Arial"/>
                         </a:rPr>
                         <a:t>Distributions</a:t>
                       </a:r>
+                    </a:p>
+                  </a:txBody>
+                  <a:tcPr>
+                    <a:solidFill>
+                      <a:schemeClr val="bg1">
+                        <a:lumMod val="85000"/>
+                      </a:schemeClr>
+                    </a:solidFill>
+                  </a:tcPr>
+                </a:tc>
+                <a:tc>
+                  <a:txBody>
+                    <a:bodyPr/>
+                    <a:lstStyle/>
+                    <a:p>
+                      <a:pPr algn="ctr"/>
+                      <a:r>
+                        <a:rPr lang="en-US" sz="1600" b="0" dirty="0">
+                          <a:solidFill>
+                            <a:schemeClr val="tx1"/>
+                          </a:solidFill>
+                          <a:latin typeface="Arial"/>
+                          <a:cs typeface="Arial"/>
+                        </a:rPr>
+                        <a:t>Samplers</a:t>
+                      </a:r>
+                    </a:p>
+                  </a:txBody>
+                  <a:tcPr>
+                    <a:solidFill>
+                      <a:schemeClr val="bg1">
+                        <a:lumMod val="85000"/>
+                      </a:schemeClr>
+                    </a:solidFill>
+                  </a:tcPr>
+                </a:tc>
+                <a:tc>
+                  <a:txBody>
+                    <a:bodyPr/>
+                    <a:lstStyle/>
+                    <a:p>
+                      <a:pPr algn="ctr"/>
+                      <a:r>
+                        <a:rPr lang="en-US" sz="1600" b="0" dirty="0" err="1">
+                          <a:solidFill>
+                            <a:schemeClr val="tx1"/>
+                          </a:solidFill>
+                          <a:latin typeface="Arial"/>
+                          <a:cs typeface="Arial"/>
+                        </a:rPr>
+                        <a:t>DataObjects</a:t>
+                      </a:r>
                       <a:endParaRPr lang="en-US" sz="1600" b="0" dirty="0">
+                        <a:solidFill>
+                          <a:schemeClr val="tx1"/>
+                        </a:solidFill>
                         <a:latin typeface="Arial"/>
                         <a:cs typeface="Arial"/>
                       </a:endParaRPr>
@@ -55271,47 +55571,13 @@
                       <a:r>
                         <a:rPr lang="en-US" sz="1600" b="0" dirty="0">
                           <a:solidFill>
-                            <a:srgbClr val="0000FF"/>
+                            <a:schemeClr val="tx1"/>
                           </a:solidFill>
                           <a:latin typeface="Arial"/>
                           <a:cs typeface="Arial"/>
                         </a:rPr>
-                        <a:t>Samplers</a:t>
+                        <a:t>Models</a:t>
                       </a:r>
-                      <a:endParaRPr lang="en-US" sz="1600" b="0" dirty="0">
-                        <a:latin typeface="Arial"/>
-                        <a:cs typeface="Arial"/>
-                      </a:endParaRPr>
-                    </a:p>
-                  </a:txBody>
-                  <a:tcPr>
-                    <a:solidFill>
-                      <a:schemeClr val="bg1">
-                        <a:lumMod val="85000"/>
-                      </a:schemeClr>
-                    </a:solidFill>
-                  </a:tcPr>
-                </a:tc>
-                <a:tc>
-                  <a:txBody>
-                    <a:bodyPr/>
-                    <a:lstStyle/>
-                    <a:p>
-                      <a:pPr algn="ctr"/>
-                      <a:r>
-                        <a:rPr lang="en-US" sz="1600" b="0" dirty="0" err="1">
-                          <a:solidFill>
-                            <a:srgbClr val="0000FF"/>
-                          </a:solidFill>
-                          <a:latin typeface="Arial"/>
-                          <a:cs typeface="Arial"/>
-                        </a:rPr>
-                        <a:t>DataObjects</a:t>
-                      </a:r>
-                      <a:endParaRPr lang="en-US" sz="1600" b="0" dirty="0">
-                        <a:latin typeface="Arial"/>
-                        <a:cs typeface="Arial"/>
-                      </a:endParaRPr>
                     </a:p>
                   </a:txBody>
                   <a:tcPr>
@@ -55331,47 +55597,13 @@
                       <a:r>
                         <a:rPr lang="en-US" sz="1600" b="0" dirty="0">
                           <a:solidFill>
-                            <a:srgbClr val="0000FF"/>
-                          </a:solidFill>
-                          <a:latin typeface="Arial"/>
-                          <a:cs typeface="Arial"/>
-                        </a:rPr>
-                        <a:t>Models</a:t>
-                      </a:r>
-                      <a:endParaRPr lang="en-US" sz="1600" b="0" dirty="0">
-                        <a:latin typeface="Arial"/>
-                        <a:cs typeface="Arial"/>
-                      </a:endParaRPr>
-                    </a:p>
-                  </a:txBody>
-                  <a:tcPr>
-                    <a:solidFill>
-                      <a:schemeClr val="bg1">
-                        <a:lumMod val="85000"/>
-                      </a:schemeClr>
-                    </a:solidFill>
-                  </a:tcPr>
-                </a:tc>
-                <a:tc>
-                  <a:txBody>
-                    <a:bodyPr/>
-                    <a:lstStyle/>
-                    <a:p>
-                      <a:pPr algn="ctr"/>
-                      <a:r>
-                        <a:rPr lang="en-US" sz="1600" b="0" dirty="0">
-                          <a:solidFill>
-                            <a:srgbClr val="0000FF"/>
+                            <a:schemeClr val="tx1"/>
                           </a:solidFill>
                           <a:latin typeface="Arial"/>
                           <a:cs typeface="Arial"/>
                         </a:rPr>
                         <a:t>Files</a:t>
                       </a:r>
-                      <a:endParaRPr lang="en-US" sz="1600" b="0" dirty="0">
-                        <a:latin typeface="Arial"/>
-                        <a:cs typeface="Arial"/>
-                      </a:endParaRPr>
                     </a:p>
                   </a:txBody>
                   <a:tcPr>
@@ -55398,7 +55630,7 @@
                       <a:r>
                         <a:rPr lang="en-US" sz="1600" b="0" dirty="0" err="1">
                           <a:solidFill>
-                            <a:srgbClr val="0000FF"/>
+                            <a:schemeClr val="tx1"/>
                           </a:solidFill>
                           <a:latin typeface="Arial"/>
                           <a:cs typeface="Arial"/>
@@ -55406,6 +55638,9 @@
                         <a:t>OutStreams</a:t>
                       </a:r>
                       <a:endParaRPr lang="en-US" sz="1600" b="0" dirty="0">
+                        <a:solidFill>
+                          <a:schemeClr val="tx1"/>
+                        </a:solidFill>
                         <a:latin typeface="Arial"/>
                         <a:cs typeface="Arial"/>
                       </a:endParaRPr>
@@ -55428,14 +55663,33 @@
                       <a:r>
                         <a:rPr lang="en-US" sz="1600" b="0" dirty="0">
                           <a:solidFill>
-                            <a:srgbClr val="0000FF"/>
+                            <a:schemeClr val="tx1"/>
                           </a:solidFill>
                           <a:latin typeface="Arial"/>
                           <a:cs typeface="Arial"/>
                         </a:rPr>
                         <a:t>Steps</a:t>
                       </a:r>
+                    </a:p>
+                  </a:txBody>
+                  <a:tcPr>
+                    <a:solidFill>
+                      <a:schemeClr val="bg1">
+                        <a:lumMod val="85000"/>
+                      </a:schemeClr>
+                    </a:solidFill>
+                  </a:tcPr>
+                </a:tc>
+                <a:tc>
+                  <a:txBody>
+                    <a:bodyPr/>
+                    <a:lstStyle/>
+                    <a:p>
+                      <a:pPr algn="ctr"/>
                       <a:endParaRPr lang="en-US" sz="1600" b="0" dirty="0">
+                        <a:solidFill>
+                          <a:schemeClr val="tx1"/>
+                        </a:solidFill>
                         <a:latin typeface="Arial"/>
                         <a:cs typeface="Arial"/>
                       </a:endParaRPr>
@@ -55456,6 +55710,9 @@
                     <a:p>
                       <a:pPr algn="ctr"/>
                       <a:endParaRPr lang="en-US" sz="1600" b="0" dirty="0">
+                        <a:solidFill>
+                          <a:schemeClr val="tx1"/>
+                        </a:solidFill>
                         <a:latin typeface="Arial"/>
                         <a:cs typeface="Arial"/>
                       </a:endParaRPr>
@@ -55476,6 +55733,9 @@
                     <a:p>
                       <a:pPr algn="ctr"/>
                       <a:endParaRPr lang="en-US" sz="1600" b="0" dirty="0">
+                        <a:solidFill>
+                          <a:schemeClr val="tx1"/>
+                        </a:solidFill>
                         <a:latin typeface="Arial"/>
                         <a:cs typeface="Arial"/>
                       </a:endParaRPr>
@@ -55496,26 +55756,9 @@
                     <a:p>
                       <a:pPr algn="ctr"/>
                       <a:endParaRPr lang="en-US" sz="1600" b="0" dirty="0">
-                        <a:latin typeface="Arial"/>
-                        <a:cs typeface="Arial"/>
-                      </a:endParaRPr>
-                    </a:p>
-                  </a:txBody>
-                  <a:tcPr>
-                    <a:solidFill>
-                      <a:schemeClr val="bg1">
-                        <a:lumMod val="85000"/>
-                      </a:schemeClr>
-                    </a:solidFill>
-                  </a:tcPr>
-                </a:tc>
-                <a:tc>
-                  <a:txBody>
-                    <a:bodyPr/>
-                    <a:lstStyle/>
-                    <a:p>
-                      <a:pPr algn="ctr"/>
-                      <a:endParaRPr lang="en-US" sz="1600" b="0" dirty="0">
+                        <a:solidFill>
+                          <a:schemeClr val="tx1"/>
+                        </a:solidFill>
                         <a:latin typeface="Arial"/>
                         <a:cs typeface="Arial"/>
                       </a:endParaRPr>

</xml_diff>